<commit_message>
pushing a bunch of things it seems I never pushed when I last worked on this in December
</commit_message>
<xml_diff>
--- a/experiments/OCean Dynamics Archiving.pptx
+++ b/experiments/OCean Dynamics Archiving.pptx
@@ -3964,7 +3964,7 @@
           <a:p>
             <a:fld id="{4C5DF3F5-BB37-4FB6-ACCC-D00CE57F6FC2}" type="datetimeFigureOut">
               <a:rPr lang="en-AU" smtClean="0"/>
-              <a:t>14/12/2021</a:t>
+              <a:t>15/12/2021</a:t>
             </a:fld>
             <a:endParaRPr lang="en-AU"/>
           </a:p>
@@ -4316,6 +4316,90 @@
 </p:notes>
 </file>
 
+<file path=ppt/notesSlides/notesSlide2.xml><?xml version="1.0" encoding="utf-8"?>
+<p:notes xmlns:a="http://schemas.openxmlformats.org/drawingml/2006/main" xmlns:r="http://schemas.openxmlformats.org/officeDocument/2006/relationships" xmlns:p="http://schemas.openxmlformats.org/presentationml/2006/main">
+  <p:cSld>
+    <p:spTree>
+      <p:nvGrpSpPr>
+        <p:cNvPr id="1" name=""/>
+        <p:cNvGrpSpPr/>
+        <p:nvPr/>
+      </p:nvGrpSpPr>
+      <p:grpSpPr>
+        <a:xfrm>
+          <a:off x="0" y="0"/>
+          <a:ext cx="0" cy="0"/>
+          <a:chOff x="0" y="0"/>
+          <a:chExt cx="0" cy="0"/>
+        </a:xfrm>
+      </p:grpSpPr>
+      <p:sp>
+        <p:nvSpPr>
+          <p:cNvPr id="2" name="Slide Image Placeholder 1"/>
+          <p:cNvSpPr>
+            <a:spLocks noGrp="1" noRot="1" noChangeAspect="1"/>
+          </p:cNvSpPr>
+          <p:nvPr>
+            <p:ph type="sldImg"/>
+          </p:nvPr>
+        </p:nvSpPr>
+        <p:spPr/>
+      </p:sp>
+      <p:sp>
+        <p:nvSpPr>
+          <p:cNvPr id="3" name="Notes Placeholder 2"/>
+          <p:cNvSpPr>
+            <a:spLocks noGrp="1"/>
+          </p:cNvSpPr>
+          <p:nvPr>
+            <p:ph type="body" idx="1"/>
+          </p:nvPr>
+        </p:nvSpPr>
+        <p:spPr/>
+        <p:txBody>
+          <a:bodyPr/>
+          <a:lstStyle/>
+          <a:p>
+            <a:endParaRPr lang="en-AU" dirty="0"/>
+          </a:p>
+        </p:txBody>
+      </p:sp>
+      <p:sp>
+        <p:nvSpPr>
+          <p:cNvPr id="4" name="Slide Number Placeholder 3"/>
+          <p:cNvSpPr>
+            <a:spLocks noGrp="1"/>
+          </p:cNvSpPr>
+          <p:nvPr>
+            <p:ph type="sldNum" sz="quarter" idx="5"/>
+          </p:nvPr>
+        </p:nvSpPr>
+        <p:spPr/>
+        <p:txBody>
+          <a:bodyPr/>
+          <a:lstStyle/>
+          <a:p>
+            <a:fld id="{75F5703F-D324-4E2E-9E7E-4DBA81353379}" type="slidenum">
+              <a:rPr lang="en-AU" smtClean="0"/>
+              <a:t>6</a:t>
+            </a:fld>
+            <a:endParaRPr lang="en-AU"/>
+          </a:p>
+        </p:txBody>
+      </p:sp>
+    </p:spTree>
+    <p:extLst>
+      <p:ext uri="{BB962C8B-B14F-4D97-AF65-F5344CB8AC3E}">
+        <p14:creationId xmlns:p14="http://schemas.microsoft.com/office/powerpoint/2010/main" val="196340811"/>
+      </p:ext>
+    </p:extLst>
+  </p:cSld>
+  <p:clrMapOvr>
+    <a:masterClrMapping/>
+  </p:clrMapOvr>
+</p:notes>
+</file>
+
 <file path=ppt/slideLayouts/slideLayout1.xml><?xml version="1.0" encoding="utf-8"?>
 <p:sldLayout xmlns:a="http://schemas.openxmlformats.org/drawingml/2006/main" xmlns:r="http://schemas.openxmlformats.org/officeDocument/2006/relationships" xmlns:p="http://schemas.openxmlformats.org/presentationml/2006/main" type="title" preserve="1">
   <p:cSld name="Title Slide">
@@ -4465,7 +4549,7 @@
           <a:p>
             <a:fld id="{C776959D-EAFA-475F-9BD5-C709F5D74E4C}" type="datetimeFigureOut">
               <a:rPr lang="en-AU" smtClean="0"/>
-              <a:t>14/12/2021</a:t>
+              <a:t>15/12/2021</a:t>
             </a:fld>
             <a:endParaRPr lang="en-AU"/>
           </a:p>
@@ -4665,7 +4749,7 @@
           <a:p>
             <a:fld id="{C776959D-EAFA-475F-9BD5-C709F5D74E4C}" type="datetimeFigureOut">
               <a:rPr lang="en-AU" smtClean="0"/>
-              <a:t>14/12/2021</a:t>
+              <a:t>15/12/2021</a:t>
             </a:fld>
             <a:endParaRPr lang="en-AU"/>
           </a:p>
@@ -4875,7 +4959,7 @@
           <a:p>
             <a:fld id="{C776959D-EAFA-475F-9BD5-C709F5D74E4C}" type="datetimeFigureOut">
               <a:rPr lang="en-AU" smtClean="0"/>
-              <a:t>14/12/2021</a:t>
+              <a:t>15/12/2021</a:t>
             </a:fld>
             <a:endParaRPr lang="en-AU"/>
           </a:p>
@@ -5075,7 +5159,7 @@
           <a:p>
             <a:fld id="{C776959D-EAFA-475F-9BD5-C709F5D74E4C}" type="datetimeFigureOut">
               <a:rPr lang="en-AU" smtClean="0"/>
-              <a:t>14/12/2021</a:t>
+              <a:t>15/12/2021</a:t>
             </a:fld>
             <a:endParaRPr lang="en-AU"/>
           </a:p>
@@ -5351,7 +5435,7 @@
           <a:p>
             <a:fld id="{C776959D-EAFA-475F-9BD5-C709F5D74E4C}" type="datetimeFigureOut">
               <a:rPr lang="en-AU" smtClean="0"/>
-              <a:t>14/12/2021</a:t>
+              <a:t>15/12/2021</a:t>
             </a:fld>
             <a:endParaRPr lang="en-AU"/>
           </a:p>
@@ -5619,7 +5703,7 @@
           <a:p>
             <a:fld id="{C776959D-EAFA-475F-9BD5-C709F5D74E4C}" type="datetimeFigureOut">
               <a:rPr lang="en-AU" smtClean="0"/>
-              <a:t>14/12/2021</a:t>
+              <a:t>15/12/2021</a:t>
             </a:fld>
             <a:endParaRPr lang="en-AU"/>
           </a:p>
@@ -6034,7 +6118,7 @@
           <a:p>
             <a:fld id="{C776959D-EAFA-475F-9BD5-C709F5D74E4C}" type="datetimeFigureOut">
               <a:rPr lang="en-AU" smtClean="0"/>
-              <a:t>14/12/2021</a:t>
+              <a:t>15/12/2021</a:t>
             </a:fld>
             <a:endParaRPr lang="en-AU"/>
           </a:p>
@@ -6176,7 +6260,7 @@
           <a:p>
             <a:fld id="{C776959D-EAFA-475F-9BD5-C709F5D74E4C}" type="datetimeFigureOut">
               <a:rPr lang="en-AU" smtClean="0"/>
-              <a:t>14/12/2021</a:t>
+              <a:t>15/12/2021</a:t>
             </a:fld>
             <a:endParaRPr lang="en-AU"/>
           </a:p>
@@ -6289,7 +6373,7 @@
           <a:p>
             <a:fld id="{C776959D-EAFA-475F-9BD5-C709F5D74E4C}" type="datetimeFigureOut">
               <a:rPr lang="en-AU" smtClean="0"/>
-              <a:t>14/12/2021</a:t>
+              <a:t>15/12/2021</a:t>
             </a:fld>
             <a:endParaRPr lang="en-AU"/>
           </a:p>
@@ -6602,7 +6686,7 @@
           <a:p>
             <a:fld id="{C776959D-EAFA-475F-9BD5-C709F5D74E4C}" type="datetimeFigureOut">
               <a:rPr lang="en-AU" smtClean="0"/>
-              <a:t>14/12/2021</a:t>
+              <a:t>15/12/2021</a:t>
             </a:fld>
             <a:endParaRPr lang="en-AU"/>
           </a:p>
@@ -6891,7 +6975,7 @@
           <a:p>
             <a:fld id="{C776959D-EAFA-475F-9BD5-C709F5D74E4C}" type="datetimeFigureOut">
               <a:rPr lang="en-AU" smtClean="0"/>
-              <a:t>14/12/2021</a:t>
+              <a:t>15/12/2021</a:t>
             </a:fld>
             <a:endParaRPr lang="en-AU"/>
           </a:p>
@@ -7134,7 +7218,7 @@
           <a:p>
             <a:fld id="{C776959D-EAFA-475F-9BD5-C709F5D74E4C}" type="datetimeFigureOut">
               <a:rPr lang="en-AU" smtClean="0"/>
-              <a:t>14/12/2021</a:t>
+              <a:t>15/12/2021</a:t>
             </a:fld>
             <a:endParaRPr lang="en-AU"/>
           </a:p>
@@ -8992,16 +9076,18 @@
         </p:nvSpPr>
         <p:spPr>
           <a:xfrm>
-            <a:off x="838200" y="-172085"/>
+            <a:off x="35718" y="-434975"/>
             <a:ext cx="10515600" cy="1325563"/>
           </a:xfrm>
         </p:spPr>
         <p:txBody>
-          <a:bodyPr/>
+          <a:bodyPr>
+            <a:normAutofit/>
+          </a:bodyPr>
           <a:lstStyle/>
           <a:p>
             <a:r>
-              <a:rPr lang="en-AU" dirty="0"/>
+              <a:rPr lang="en-AU" sz="2000" dirty="0"/>
               <a:t>Process Levels</a:t>
             </a:r>
           </a:p>
@@ -9022,14 +9108,14 @@
           <p:nvPr>
             <p:extLst>
               <p:ext uri="{D42A27DB-BD31-4B8C-83A1-F6EECF244321}">
-                <p14:modId xmlns:p14="http://schemas.microsoft.com/office/powerpoint/2010/main" val="3998198033"/>
+                <p14:modId xmlns:p14="http://schemas.microsoft.com/office/powerpoint/2010/main" val="2691388962"/>
               </p:ext>
             </p:extLst>
           </p:nvPr>
         </p:nvGraphicFramePr>
         <p:xfrm>
-          <a:off x="200026" y="937260"/>
-          <a:ext cx="11835761" cy="5506658"/>
+          <a:off x="331474" y="463731"/>
+          <a:ext cx="11292837" cy="5769012"/>
         </p:xfrm>
         <a:graphic>
           <a:graphicData uri="http://schemas.openxmlformats.org/drawingml/2006/table">
@@ -9038,52 +9124,73 @@
                 <a:tableStyleId>{5C22544A-7EE6-4342-B048-85BDC9FD1C3A}</a:tableStyleId>
               </a:tblPr>
               <a:tblGrid>
-                <a:gridCol w="354329">
+                <a:gridCol w="331152">
                   <a:extLst>
                     <a:ext uri="{9D8B030D-6E8A-4147-A177-3AD203B41FA5}">
                       <a16:colId xmlns:a16="http://schemas.microsoft.com/office/drawing/2014/main" val="344093900"/>
                     </a:ext>
                   </a:extLst>
                 </a:gridCol>
-                <a:gridCol w="1913572">
+                <a:gridCol w="1165632">
                   <a:extLst>
                     <a:ext uri="{9D8B030D-6E8A-4147-A177-3AD203B41FA5}">
                       <a16:colId xmlns:a16="http://schemas.microsoft.com/office/drawing/2014/main" val="2805533984"/>
                     </a:ext>
                   </a:extLst>
                 </a:gridCol>
-                <a:gridCol w="1913572">
+                <a:gridCol w="1770590">
                   <a:extLst>
                     <a:ext uri="{9D8B030D-6E8A-4147-A177-3AD203B41FA5}">
                       <a16:colId xmlns:a16="http://schemas.microsoft.com/office/drawing/2014/main" val="4080551734"/>
                     </a:ext>
                   </a:extLst>
                 </a:gridCol>
-                <a:gridCol w="1913572">
+                <a:gridCol w="1350759">
                   <a:extLst>
                     <a:ext uri="{9D8B030D-6E8A-4147-A177-3AD203B41FA5}">
                       <a16:colId xmlns:a16="http://schemas.microsoft.com/office/drawing/2014/main" val="2989395010"/>
                     </a:ext>
                   </a:extLst>
                 </a:gridCol>
-                <a:gridCol w="1913572">
+                <a:gridCol w="1320337">
                   <a:extLst>
                     <a:ext uri="{9D8B030D-6E8A-4147-A177-3AD203B41FA5}">
                       <a16:colId xmlns:a16="http://schemas.microsoft.com/office/drawing/2014/main" val="1578418497"/>
                     </a:ext>
                   </a:extLst>
                 </a:gridCol>
-                <a:gridCol w="1913572">
+                <a:gridCol w="1143887">
                   <a:extLst>
                     <a:ext uri="{9D8B030D-6E8A-4147-A177-3AD203B41FA5}">
                       <a16:colId xmlns:a16="http://schemas.microsoft.com/office/drawing/2014/main" val="2615136872"/>
                     </a:ext>
                   </a:extLst>
                 </a:gridCol>
-                <a:gridCol w="1913572">
+                <a:gridCol w="1052620">
                   <a:extLst>
                     <a:ext uri="{9D8B030D-6E8A-4147-A177-3AD203B41FA5}">
                       <a16:colId xmlns:a16="http://schemas.microsoft.com/office/drawing/2014/main" val="2313601075"/>
+                    </a:ext>
+                  </a:extLst>
+                </a:gridCol>
+                <a:gridCol w="1052620">
+                  <a:extLst>
+                    <a:ext uri="{9D8B030D-6E8A-4147-A177-3AD203B41FA5}">
+                      <a16:colId xmlns:a16="http://schemas.microsoft.com/office/drawing/2014/main" val="3476346292"/>
+                    </a:ext>
+                  </a:extLst>
+                </a:gridCol>
+                <a:gridCol w="1052620">
+                  <a:extLst>
+                    <a:ext uri="{9D8B030D-6E8A-4147-A177-3AD203B41FA5}">
+                      <a16:colId xmlns:a16="http://schemas.microsoft.com/office/drawing/2014/main" val="968653063"/>
+                    </a:ext>
+                  </a:extLst>
+                </a:gridCol>
+                <a:gridCol w="1052620">
+                  <a:extLst>
+                    <a:ext uri="{9D8B030D-6E8A-4147-A177-3AD203B41FA5}">
+                      <a16:colId xmlns:a16="http://schemas.microsoft.com/office/drawing/2014/main" val="2481578932"/>
                     </a:ext>
                   </a:extLst>
                 </a:gridCol>
@@ -9095,7 +9202,7 @@
                     <a:lstStyle/>
                     <a:p>
                       <a:r>
-                        <a:rPr lang="en-AU" sz="1100" dirty="0"/>
+                        <a:rPr lang="en-AU" sz="900" dirty="0"/>
                         <a:t>PL</a:t>
                       </a:r>
                     </a:p>
@@ -9108,7 +9215,7 @@
                     <a:lstStyle/>
                     <a:p>
                       <a:r>
-                        <a:rPr lang="en-AU" sz="1100" dirty="0"/>
+                        <a:rPr lang="en-AU" sz="900" dirty="0"/>
                         <a:t>Seabird 37, 39, 56</a:t>
                       </a:r>
                     </a:p>
@@ -9121,7 +9228,7 @@
                     <a:lstStyle/>
                     <a:p>
                       <a:r>
-                        <a:rPr lang="en-AU" sz="1100" dirty="0"/>
+                        <a:rPr lang="en-AU" sz="900" dirty="0"/>
                         <a:t>Teledyne RDI</a:t>
                       </a:r>
                     </a:p>
@@ -9134,7 +9241,7 @@
                     <a:lstStyle/>
                     <a:p>
                       <a:r>
-                        <a:rPr lang="en-AU" sz="1100" dirty="0"/>
+                        <a:rPr lang="en-AU" sz="900" dirty="0"/>
                         <a:t>Signature</a:t>
                       </a:r>
                     </a:p>
@@ -9147,7 +9254,7 @@
                     <a:lstStyle/>
                     <a:p>
                       <a:r>
-                        <a:rPr lang="en-AU" sz="1100" dirty="0"/>
+                        <a:rPr lang="en-AU" sz="900" dirty="0"/>
                         <a:t>Vectors</a:t>
                       </a:r>
                     </a:p>
@@ -9160,10 +9267,10 @@
                     <a:lstStyle/>
                     <a:p>
                       <a:r>
-                        <a:rPr lang="en-AU" sz="1100" dirty="0" err="1"/>
+                        <a:rPr lang="en-AU" sz="900" dirty="0" err="1"/>
                         <a:t>Wetlabs</a:t>
                       </a:r>
-                      <a:endParaRPr lang="en-AU" sz="1100" dirty="0"/>
+                      <a:endParaRPr lang="en-AU" sz="900" dirty="0"/>
                     </a:p>
                   </a:txBody>
                   <a:tcPr/>
@@ -9174,8 +9281,47 @@
                     <a:lstStyle/>
                     <a:p>
                       <a:r>
-                        <a:rPr lang="en-AU" sz="1100" dirty="0"/>
+                        <a:rPr lang="en-AU" sz="900" dirty="0"/>
                         <a:t>LISST</a:t>
+                      </a:r>
+                    </a:p>
+                  </a:txBody>
+                  <a:tcPr/>
+                </a:tc>
+                <a:tc>
+                  <a:txBody>
+                    <a:bodyPr/>
+                    <a:lstStyle/>
+                    <a:p>
+                      <a:r>
+                        <a:rPr lang="en-AU" sz="900" dirty="0"/>
+                        <a:t>Profiling CTD</a:t>
+                      </a:r>
+                    </a:p>
+                  </a:txBody>
+                  <a:tcPr/>
+                </a:tc>
+                <a:tc>
+                  <a:txBody>
+                    <a:bodyPr/>
+                    <a:lstStyle/>
+                    <a:p>
+                      <a:r>
+                        <a:rPr lang="en-AU" sz="900" dirty="0"/>
+                        <a:t>Profiling VMP</a:t>
+                      </a:r>
+                    </a:p>
+                  </a:txBody>
+                  <a:tcPr/>
+                </a:tc>
+                <a:tc>
+                  <a:txBody>
+                    <a:bodyPr/>
+                    <a:lstStyle/>
+                    <a:p>
+                      <a:r>
+                        <a:rPr lang="en-AU" sz="900" dirty="0"/>
+                        <a:t>Profiling LISST</a:t>
                       </a:r>
                     </a:p>
                   </a:txBody>
@@ -9187,15 +9333,15 @@
                   </a:ext>
                 </a:extLst>
               </a:tr>
-              <a:tr h="2814918">
+              <a:tr h="0">
                 <a:tc>
                   <a:txBody>
                     <a:bodyPr/>
                     <a:lstStyle/>
                     <a:p>
                       <a:r>
-                        <a:rPr lang="en-AU" sz="1100" dirty="0"/>
-                        <a:t>1</a:t>
+                        <a:rPr lang="en-AU" sz="900" dirty="0"/>
+                        <a:t>0</a:t>
                       </a:r>
                     </a:p>
                   </a:txBody>
@@ -9207,33 +9353,8 @@
                     <a:lstStyle/>
                     <a:p>
                       <a:r>
-                        <a:rPr lang="en-AU" sz="1100" dirty="0"/>
-                        <a:t>Read</a:t>
-                      </a:r>
-                    </a:p>
-                    <a:p>
-                      <a:r>
-                        <a:rPr lang="en-AU" sz="1100" dirty="0"/>
-                        <a:t>Build structure</a:t>
-                      </a:r>
-                    </a:p>
-                    <a:p>
-                      <a:r>
-                        <a:rPr lang="en-AU" sz="1100" dirty="0"/>
-                        <a:t>Calibrate</a:t>
-                      </a:r>
-                    </a:p>
-                    <a:p>
-                      <a:r>
-                        <a:rPr lang="en-AU" sz="1100" dirty="0" err="1"/>
-                        <a:t>pimosInOutWaterQC</a:t>
-                      </a:r>
-                      <a:endParaRPr lang="en-AU" sz="1100" dirty="0"/>
-                    </a:p>
-                    <a:p>
-                      <a:r>
-                        <a:rPr lang="en-AU" sz="1100" dirty="0"/>
-                        <a:t>Export</a:t>
+                        <a:rPr lang="en-AU" sz="900" dirty="0"/>
+                        <a:t>*</a:t>
                       </a:r>
                     </a:p>
                   </a:txBody>
@@ -9245,77 +9366,9 @@
                     <a:lstStyle/>
                     <a:p>
                       <a:r>
-                        <a:rPr lang="en-AU" sz="1100" dirty="0"/>
-                        <a:t>Read</a:t>
-                      </a:r>
-                    </a:p>
-                    <a:p>
-                      <a:r>
-                        <a:rPr lang="en-AU" sz="1100" dirty="0"/>
-                        <a:t>Build structure</a:t>
-                      </a:r>
-                    </a:p>
-                    <a:p>
-                      <a:r>
-                        <a:rPr lang="en-AU" sz="1100" dirty="0" err="1"/>
-                        <a:t>pimosInOutWaterQC</a:t>
-                      </a:r>
-                      <a:endParaRPr lang="en-AU" sz="1100" dirty="0"/>
-                    </a:p>
-                    <a:p>
-                      <a:r>
-                        <a:rPr lang="en-AU" sz="1100" dirty="0" err="1"/>
-                        <a:t>pimosTiltVelocitySimpleQC</a:t>
-                      </a:r>
-                      <a:endParaRPr lang="en-AU" sz="1100" dirty="0"/>
-                    </a:p>
-                    <a:p>
-                      <a:r>
-                        <a:rPr lang="en-AU" sz="1100" dirty="0" err="1"/>
-                        <a:t>pimosEchoIntensitySimpleQC</a:t>
-                      </a:r>
-                      <a:endParaRPr lang="en-AU" sz="1100" dirty="0"/>
-                    </a:p>
-                    <a:p>
-                      <a:r>
-                        <a:rPr lang="en-AU" sz="1100" dirty="0" err="1"/>
-                        <a:t>pimosErrorVelocitySetQC</a:t>
-                      </a:r>
-                      <a:endParaRPr lang="en-AU" sz="1100" dirty="0"/>
-                    </a:p>
-                    <a:p>
-                      <a:r>
-                        <a:rPr lang="en-AU" sz="1100" dirty="0" err="1"/>
-                        <a:t>pimosCorrMagVelocitySetQC</a:t>
-                      </a:r>
-                      <a:endParaRPr lang="en-AU" sz="1100" dirty="0"/>
-                    </a:p>
-                    <a:p>
-                      <a:r>
-                        <a:rPr lang="en-AU" sz="1100" dirty="0" err="1"/>
-                        <a:t>pimosPercentGoodVelocitySetRDIQC</a:t>
-                      </a:r>
-                      <a:endParaRPr lang="en-AU" sz="1100" dirty="0"/>
-                    </a:p>
-                    <a:p>
-                      <a:r>
-                        <a:rPr lang="en-AU" sz="1100" dirty="0"/>
-                        <a:t>Export</a:t>
-                      </a:r>
-                    </a:p>
-                    <a:p>
-                      <a:endParaRPr lang="en-AU" sz="1100" dirty="0"/>
-                    </a:p>
-                    <a:p>
-                      <a:r>
-                        <a:rPr lang="en-AU" sz="1100" dirty="0">
-                          <a:solidFill>
-                            <a:srgbClr val="FF0000"/>
-                          </a:solidFill>
-                        </a:rPr>
-                        <a:t>NEED TO IMPLEMENT THE STANDARD FISH DETECTION</a:t>
-                      </a:r>
-                      <a:endParaRPr lang="en-AU" sz="1100" dirty="0"/>
+                        <a:rPr lang="en-AU" sz="900" dirty="0"/>
+                        <a:t>*</a:t>
+                      </a:r>
                     </a:p>
                   </a:txBody>
                   <a:tcPr/>
@@ -9326,67 +9379,9 @@
                     <a:lstStyle/>
                     <a:p>
                       <a:r>
-                        <a:rPr lang="en-AU" sz="1100" dirty="0"/>
-                        <a:t>Read</a:t>
-                      </a:r>
-                    </a:p>
-                    <a:p>
-                      <a:r>
-                        <a:rPr lang="en-AU" sz="1100" dirty="0"/>
-                        <a:t>Build structure</a:t>
-                      </a:r>
-                    </a:p>
-                    <a:p>
-                      <a:r>
-                        <a:rPr lang="en-AU" sz="1100" dirty="0" err="1"/>
-                        <a:t>pimosInOutWaterQC</a:t>
-                      </a:r>
-                      <a:endParaRPr lang="en-AU" sz="1100" dirty="0"/>
-                    </a:p>
-                    <a:p>
-                      <a:r>
-                        <a:rPr lang="en-AU" sz="1100" dirty="0" err="1"/>
-                        <a:t>pimosTiltVelocitySimpleQC</a:t>
-                      </a:r>
-                      <a:endParaRPr lang="en-AU" sz="1100" dirty="0"/>
-                    </a:p>
-                    <a:p>
-                      <a:r>
-                        <a:rPr lang="en-AU" sz="1100" dirty="0" err="1"/>
-                        <a:t>pimosEchoIntensitySimpleQC</a:t>
-                      </a:r>
-                      <a:endParaRPr lang="en-AU" sz="1100" dirty="0"/>
-                    </a:p>
-                    <a:p>
-                      <a:r>
-                        <a:rPr lang="en-AU" sz="1100" dirty="0" err="1"/>
-                        <a:t>pimosCorrMagVelocitySetQC</a:t>
-                      </a:r>
-                      <a:endParaRPr lang="en-AU" sz="1100" dirty="0"/>
-                    </a:p>
-                    <a:p>
-                      <a:r>
-                        <a:rPr lang="en-AU" sz="1100" dirty="0"/>
-                        <a:t>Export</a:t>
-                      </a:r>
-                    </a:p>
-                    <a:p>
-                      <a:endParaRPr lang="en-AU" sz="1100" dirty="0">
-                        <a:solidFill>
-                          <a:srgbClr val="FF0000"/>
-                        </a:solidFill>
-                      </a:endParaRPr>
-                    </a:p>
-                    <a:p>
-                      <a:r>
-                        <a:rPr lang="en-AU" sz="1100" dirty="0">
-                          <a:solidFill>
-                            <a:srgbClr val="FF0000"/>
-                          </a:solidFill>
-                        </a:rPr>
-                        <a:t>NEED TO IMPLEMENT THE ALONG-BEAM FISH DETECTION. </a:t>
-                      </a:r>
-                      <a:endParaRPr lang="en-AU" sz="1100" dirty="0"/>
+                        <a:rPr lang="en-AU" sz="900" dirty="0"/>
+                        <a:t>*</a:t>
+                      </a:r>
                     </a:p>
                   </a:txBody>
                   <a:tcPr/>
@@ -9397,102 +9392,9 @@
                     <a:lstStyle/>
                     <a:p>
                       <a:r>
-                        <a:rPr lang="en-AU" sz="1100" dirty="0"/>
-                        <a:t>Read</a:t>
-                      </a:r>
-                    </a:p>
-                    <a:p>
-                      <a:r>
-                        <a:rPr lang="en-AU" sz="1100" dirty="0"/>
-                        <a:t>Build structure</a:t>
-                      </a:r>
-                    </a:p>
-                    <a:p>
-                      <a:r>
-                        <a:rPr lang="en-AU" sz="1100" dirty="0" err="1"/>
-                        <a:t>pimosInOutWaterQC</a:t>
-                      </a:r>
-                      <a:endParaRPr lang="en-AU" sz="1100" dirty="0"/>
-                    </a:p>
-                    <a:p>
-                      <a:r>
-                        <a:rPr lang="en-AU" sz="1100" dirty="0" err="1"/>
-                        <a:t>pimosFishDetectionQC</a:t>
-                      </a:r>
-                      <a:endParaRPr lang="en-AU" sz="1100" dirty="0"/>
-                    </a:p>
-                    <a:p>
-                      <a:r>
-                        <a:rPr lang="en-AU" sz="1100" dirty="0" err="1"/>
-                        <a:t>pimosCorrMagVelocitySetQC</a:t>
-                      </a:r>
-                      <a:endParaRPr lang="en-AU" sz="1100" dirty="0"/>
-                    </a:p>
-                    <a:p>
-                      <a:r>
-                        <a:rPr lang="en-AU" sz="1100" dirty="0"/>
-                        <a:t>export</a:t>
-                      </a:r>
-                    </a:p>
-                    <a:p>
-                      <a:endParaRPr lang="en-AU" sz="1100" dirty="0">
-                        <a:solidFill>
-                          <a:srgbClr val="FF0000"/>
-                        </a:solidFill>
-                      </a:endParaRPr>
-                    </a:p>
-                    <a:p>
-                      <a:r>
-                        <a:rPr lang="en-AU" sz="1100" dirty="0">
-                          <a:solidFill>
-                            <a:srgbClr val="FF0000"/>
-                          </a:solidFill>
-                        </a:rPr>
-                        <a:t>The 6019 tilt sensor was broken. Tilt data is </a:t>
-                      </a:r>
-                      <a:r>
-                        <a:rPr lang="en-AU" sz="1100" dirty="0" err="1">
-                          <a:solidFill>
-                            <a:srgbClr val="FF0000"/>
-                          </a:solidFill>
-                        </a:rPr>
-                        <a:t>QCd</a:t>
-                      </a:r>
-                      <a:r>
-                        <a:rPr lang="en-AU" sz="1100" dirty="0">
-                          <a:solidFill>
-                            <a:srgbClr val="FF0000"/>
-                          </a:solidFill>
-                        </a:rPr>
-                        <a:t> out manually and commented</a:t>
-                      </a:r>
-                    </a:p>
-                    <a:p>
-                      <a:endParaRPr lang="en-AU" sz="1100" dirty="0">
-                        <a:solidFill>
-                          <a:srgbClr val="FF0000"/>
-                        </a:solidFill>
-                      </a:endParaRPr>
-                    </a:p>
-                    <a:p>
-                      <a:r>
-                        <a:rPr lang="en-AU" sz="1100" dirty="0">
-                          <a:solidFill>
-                            <a:srgbClr val="FF0000"/>
-                          </a:solidFill>
-                        </a:rPr>
-                        <a:t>Frame interference? This is a bit of a bespoke step, calculated after turbulence calcs. Not sure where this should come in?</a:t>
-                      </a:r>
-                    </a:p>
-                    <a:p>
-                      <a:endParaRPr lang="en-AU" sz="1100" dirty="0">
-                        <a:solidFill>
-                          <a:srgbClr val="FF0000"/>
-                        </a:solidFill>
-                      </a:endParaRPr>
-                    </a:p>
-                    <a:p>
-                      <a:endParaRPr lang="en-AU" sz="1100" dirty="0"/>
+                        <a:rPr lang="en-AU" sz="900" dirty="0"/>
+                        <a:t>*</a:t>
+                      </a:r>
                     </a:p>
                   </a:txBody>
                   <a:tcPr/>
@@ -9503,42 +9405,9 @@
                     <a:lstStyle/>
                     <a:p>
                       <a:r>
-                        <a:rPr lang="en-AU" sz="1100" dirty="0"/>
-                        <a:t>Read</a:t>
-                      </a:r>
-                    </a:p>
-                    <a:p>
-                      <a:r>
-                        <a:rPr lang="en-AU" sz="1100" dirty="0"/>
-                        <a:t>Build structure</a:t>
-                      </a:r>
-                    </a:p>
-                    <a:p>
-                      <a:r>
-                        <a:rPr lang="en-AU" sz="1100" dirty="0"/>
-                        <a:t>_</a:t>
-                      </a:r>
-                      <a:r>
-                        <a:rPr lang="en-AU" sz="1100" dirty="0" err="1"/>
-                        <a:t>calibrate_device</a:t>
-                      </a:r>
-                      <a:endParaRPr lang="en-AU" sz="1100" dirty="0"/>
-                    </a:p>
-                    <a:p>
-                      <a:r>
-                        <a:rPr lang="en-AU" sz="1100" dirty="0" err="1"/>
-                        <a:t>pimosInOutWaterQC</a:t>
-                      </a:r>
-                      <a:endParaRPr lang="en-AU" sz="1100" dirty="0"/>
-                    </a:p>
-                    <a:p>
-                      <a:r>
-                        <a:rPr lang="en-AU" sz="1100" dirty="0"/>
-                        <a:t>export</a:t>
-                      </a:r>
-                    </a:p>
-                    <a:p>
-                      <a:endParaRPr lang="en-AU" sz="1100" dirty="0"/>
+                        <a:rPr lang="en-AU" sz="900" dirty="0"/>
+                        <a:t>*</a:t>
+                      </a:r>
                     </a:p>
                   </a:txBody>
                   <a:tcPr/>
@@ -9549,97 +9418,22 @@
                     <a:lstStyle/>
                     <a:p>
                       <a:r>
-                        <a:rPr lang="en-AU" sz="1100" dirty="0"/>
+                        <a:rPr lang="en-AU" sz="900" dirty="0"/>
                         <a:t>Read</a:t>
                       </a:r>
                     </a:p>
                     <a:p>
                       <a:r>
-                        <a:rPr lang="en-AU" sz="1100" dirty="0"/>
+                        <a:rPr lang="en-AU" sz="900" dirty="0"/>
                         <a:t>Build structure</a:t>
                       </a:r>
                     </a:p>
                     <a:p>
                       <a:r>
-                        <a:rPr lang="en-AU" sz="1100" dirty="0"/>
+                        <a:rPr lang="en-AU" sz="900" dirty="0"/>
                         <a:t>Export</a:t>
                       </a:r>
                     </a:p>
-                    <a:p>
-                      <a:endParaRPr lang="en-AU" sz="1100" dirty="0"/>
-                    </a:p>
-                    <a:p>
-                      <a:r>
-                        <a:rPr lang="en-AU" sz="1100" dirty="0">
-                          <a:solidFill>
-                            <a:srgbClr val="FF0000"/>
-                          </a:solidFill>
-                        </a:rPr>
-                        <a:t>Really this is process level 0. Need to implement CF compliance, associate </a:t>
-                      </a:r>
-                      <a:r>
-                        <a:rPr lang="en-AU" sz="1100" dirty="0" err="1">
-                          <a:solidFill>
-                            <a:srgbClr val="FF0000"/>
-                          </a:solidFill>
-                        </a:rPr>
-                        <a:t>qc_flags</a:t>
-                      </a:r>
-                      <a:r>
-                        <a:rPr lang="en-AU" sz="1100" dirty="0">
-                          <a:solidFill>
-                            <a:srgbClr val="FF0000"/>
-                          </a:solidFill>
-                        </a:rPr>
-                        <a:t> and add some auto </a:t>
-                      </a:r>
-                      <a:r>
-                        <a:rPr lang="en-AU" sz="1100" dirty="0" err="1">
-                          <a:solidFill>
-                            <a:srgbClr val="FF0000"/>
-                          </a:solidFill>
-                        </a:rPr>
-                        <a:t>qc_routines</a:t>
-                      </a:r>
-                      <a:r>
-                        <a:rPr lang="en-AU" sz="1100" dirty="0">
-                          <a:solidFill>
-                            <a:srgbClr val="FF0000"/>
-                          </a:solidFill>
-                        </a:rPr>
-                        <a:t>. </a:t>
-                      </a:r>
-                    </a:p>
-                    <a:p>
-                      <a:endParaRPr lang="en-AU" sz="1100" dirty="0"/>
-                    </a:p>
-                  </a:txBody>
-                  <a:tcPr/>
-                </a:tc>
-                <a:extLst>
-                  <a:ext uri="{0D108BD9-81ED-4DB2-BD59-A6C34878D82A}">
-                    <a16:rowId xmlns:a16="http://schemas.microsoft.com/office/drawing/2014/main" val="2323022161"/>
-                  </a:ext>
-                </a:extLst>
-              </a:tr>
-              <a:tr h="856714">
-                <a:tc>
-                  <a:txBody>
-                    <a:bodyPr/>
-                    <a:lstStyle/>
-                    <a:p>
-                      <a:r>
-                        <a:rPr lang="en-AU" sz="1100" dirty="0"/>
-                        <a:t>2</a:t>
-                      </a:r>
-                    </a:p>
-                  </a:txBody>
-                  <a:tcPr/>
-                </a:tc>
-                <a:tc>
-                  <a:txBody>
-                    <a:bodyPr/>
-                    <a:lstStyle/>
                     <a:p>
                       <a:pPr marL="0" marR="0" lvl="0" indent="0" algn="l" defTabSz="914400" rtl="0" eaLnBrk="1" fontAlgn="auto" latinLnBrk="0" hangingPunct="1">
                         <a:lnSpc>
@@ -9659,16 +9453,32 @@
                         <a:defRPr/>
                       </a:pPr>
                       <a:r>
-                        <a:rPr lang="en-AU" sz="1100" dirty="0"/>
-                        <a:t>Goring </a:t>
-                      </a:r>
-                      <a:r>
-                        <a:rPr lang="en-AU" sz="1100" dirty="0" err="1"/>
-                        <a:t>Nikora</a:t>
-                      </a:r>
-                      <a:r>
-                        <a:rPr lang="en-AU" sz="1100" dirty="0"/>
-                        <a:t>?</a:t>
+                        <a:rPr lang="en-AU" sz="900" dirty="0">
+                          <a:solidFill>
+                            <a:srgbClr val="FF0000"/>
+                          </a:solidFill>
+                        </a:rPr>
+                        <a:t>Need to add attributes from the log file</a:t>
+                      </a:r>
+                      <a:endParaRPr lang="en-AU" sz="900" dirty="0"/>
+                    </a:p>
+                  </a:txBody>
+                  <a:tcPr/>
+                </a:tc>
+                <a:tc>
+                  <a:txBody>
+                    <a:bodyPr/>
+                    <a:lstStyle/>
+                    <a:p>
+                      <a:r>
+                        <a:rPr lang="en-AU" sz="900" dirty="0"/>
+                        <a:t>Read</a:t>
+                      </a:r>
+                    </a:p>
+                    <a:p>
+                      <a:r>
+                        <a:rPr lang="en-AU" sz="900" dirty="0"/>
+                        <a:t>Build structure</a:t>
                       </a:r>
                     </a:p>
                     <a:p>
@@ -9690,15 +9500,18 @@
                         <a:defRPr/>
                       </a:pPr>
                       <a:r>
-                        <a:rPr lang="en-AU" sz="1100" dirty="0"/>
-                        <a:t>Time filter/align</a:t>
-                      </a:r>
-                    </a:p>
-                    <a:p>
-                      <a:r>
-                        <a:rPr lang="en-AU" sz="1100" dirty="0"/>
-                        <a:t>Stack Moorings</a:t>
-                      </a:r>
+                        <a:rPr lang="en-AU" sz="900" dirty="0"/>
+                        <a:t>Add attributes</a:t>
+                      </a:r>
+                    </a:p>
+                    <a:p>
+                      <a:r>
+                        <a:rPr lang="en-AU" sz="900" dirty="0"/>
+                        <a:t>Export</a:t>
+                      </a:r>
+                    </a:p>
+                    <a:p>
+                      <a:endParaRPr lang="en-AU" sz="900" dirty="0"/>
                     </a:p>
                   </a:txBody>
                   <a:tcPr/>
@@ -9709,101 +9522,30 @@
                     <a:lstStyle/>
                     <a:p>
                       <a:r>
-                        <a:rPr lang="en-AU" sz="1100" dirty="0"/>
-                        <a:t>ENU with </a:t>
-                      </a:r>
-                      <a:r>
-                        <a:rPr lang="en-AU" sz="1100" dirty="0" err="1"/>
-                        <a:t>BinMap</a:t>
-                      </a:r>
-                      <a:endParaRPr lang="en-AU" sz="1100" dirty="0"/>
-                    </a:p>
-                    <a:p>
-                      <a:r>
-                        <a:rPr lang="en-AU" sz="1100" dirty="0"/>
-                        <a:t>Time filter/align</a:t>
-                      </a:r>
-                    </a:p>
-                    <a:p>
-                      <a:r>
-                        <a:rPr lang="en-AU" sz="1100" dirty="0"/>
-                        <a:t>Replace missing data</a:t>
-                      </a:r>
-                    </a:p>
-                    <a:p>
-                      <a:r>
-                        <a:rPr lang="en-AU" sz="1100" dirty="0"/>
-                        <a:t>Stack moorings</a:t>
-                      </a:r>
-                    </a:p>
-                  </a:txBody>
-                  <a:tcPr/>
-                </a:tc>
-                <a:tc>
-                  <a:txBody>
-                    <a:bodyPr/>
-                    <a:lstStyle/>
-                    <a:p>
-                      <a:r>
-                        <a:rPr lang="en-AU" sz="1100" dirty="0"/>
-                        <a:t>ENU</a:t>
-                      </a:r>
-                    </a:p>
-                    <a:p>
-                      <a:r>
-                        <a:rPr lang="en-AU" sz="1100" dirty="0"/>
-                        <a:t>Phase unwrap</a:t>
-                      </a:r>
-                    </a:p>
-                    <a:p>
-                      <a:r>
-                        <a:rPr lang="en-AU" sz="1100" dirty="0"/>
-                        <a:t>Replace missing data</a:t>
-                      </a:r>
-                    </a:p>
-                    <a:p>
-                      <a:endParaRPr lang="en-AU" sz="1100" dirty="0"/>
-                    </a:p>
-                    <a:p>
-                      <a:r>
-                        <a:rPr lang="en-AU" sz="1100" b="0" dirty="0">
+                        <a:rPr lang="en-AU" sz="900" dirty="0"/>
+                        <a:t>Read</a:t>
+                      </a:r>
+                    </a:p>
+                    <a:p>
+                      <a:r>
+                        <a:rPr lang="en-AU" sz="900" dirty="0"/>
+                        <a:t>Deconvolve</a:t>
+                      </a:r>
+                    </a:p>
+                    <a:p>
+                      <a:r>
+                        <a:rPr lang="en-AU" sz="900" dirty="0"/>
+                        <a:t>Physical Units</a:t>
+                      </a:r>
+                    </a:p>
+                    <a:p>
+                      <a:r>
+                        <a:rPr lang="en-AU" sz="900" dirty="0">
                           <a:solidFill>
                             <a:srgbClr val="FF0000"/>
                           </a:solidFill>
                         </a:rPr>
-                        <a:t>SIGNATURE BIN MAP NOT IMPLEMENTED</a:t>
-                      </a:r>
-                    </a:p>
-                  </a:txBody>
-                  <a:tcPr/>
-                </a:tc>
-                <a:tc>
-                  <a:txBody>
-                    <a:bodyPr/>
-                    <a:lstStyle/>
-                    <a:p>
-                      <a:r>
-                        <a:rPr lang="en-AU" sz="1100" dirty="0"/>
-                        <a:t>Replace missing data</a:t>
-                      </a:r>
-                    </a:p>
-                    <a:p>
-                      <a:r>
-                        <a:rPr lang="en-AU" sz="1100" dirty="0"/>
-                        <a:t>Phase unwrap</a:t>
-                      </a:r>
-                    </a:p>
-                  </a:txBody>
-                  <a:tcPr/>
-                </a:tc>
-                <a:tc>
-                  <a:txBody>
-                    <a:bodyPr/>
-                    <a:lstStyle/>
-                    <a:p>
-                      <a:r>
-                        <a:rPr lang="en-AU" sz="1100" dirty="0"/>
-                        <a:t>Burst Median? </a:t>
+                        <a:t>Build structure</a:t>
                       </a:r>
                     </a:p>
                     <a:p>
@@ -9825,20 +9567,26 @@
                         <a:defRPr/>
                       </a:pPr>
                       <a:r>
-                        <a:rPr lang="en-AU" sz="1100" dirty="0"/>
-                        <a:t>Goring </a:t>
-                      </a:r>
-                      <a:r>
-                        <a:rPr lang="en-AU" sz="1100" dirty="0" err="1"/>
-                        <a:t>Nikora</a:t>
-                      </a:r>
-                      <a:r>
-                        <a:rPr lang="en-AU" sz="1100" dirty="0"/>
-                        <a:t>?</a:t>
-                      </a:r>
-                    </a:p>
-                    <a:p>
-                      <a:endParaRPr lang="en-AU" sz="1100" dirty="0"/>
+                        <a:rPr lang="en-AU" sz="900" dirty="0">
+                          <a:solidFill>
+                            <a:srgbClr val="FF0000"/>
+                          </a:solidFill>
+                        </a:rPr>
+                        <a:t>Add attributes</a:t>
+                      </a:r>
+                    </a:p>
+                    <a:p>
+                      <a:r>
+                        <a:rPr lang="en-AU" sz="900" dirty="0">
+                          <a:solidFill>
+                            <a:srgbClr val="FF0000"/>
+                          </a:solidFill>
+                        </a:rPr>
+                        <a:t>Export</a:t>
+                      </a:r>
+                    </a:p>
+                    <a:p>
+                      <a:endParaRPr lang="en-AU" sz="900" dirty="0"/>
                     </a:p>
                   </a:txBody>
                   <a:tcPr/>
@@ -9848,26 +9596,29 @@
                     <a:bodyPr/>
                     <a:lstStyle/>
                     <a:p>
-                      <a:endParaRPr lang="en-AU" sz="1100" dirty="0"/>
+                      <a:r>
+                        <a:rPr lang="en-AU" sz="900" dirty="0"/>
+                        <a:t>**</a:t>
+                      </a:r>
                     </a:p>
                   </a:txBody>
                   <a:tcPr/>
                 </a:tc>
                 <a:extLst>
                   <a:ext uri="{0D108BD9-81ED-4DB2-BD59-A6C34878D82A}">
-                    <a16:rowId xmlns:a16="http://schemas.microsoft.com/office/drawing/2014/main" val="1001779354"/>
+                    <a16:rowId xmlns:a16="http://schemas.microsoft.com/office/drawing/2014/main" val="2580966833"/>
                   </a:ext>
                 </a:extLst>
               </a:tr>
-              <a:tr h="650209">
+              <a:tr h="2555090">
                 <a:tc>
                   <a:txBody>
                     <a:bodyPr/>
                     <a:lstStyle/>
                     <a:p>
                       <a:r>
-                        <a:rPr lang="en-AU" sz="1100" dirty="0"/>
-                        <a:t>3</a:t>
+                        <a:rPr lang="en-AU" sz="900" dirty="0"/>
+                        <a:t>1</a:t>
                       </a:r>
                     </a:p>
                   </a:txBody>
@@ -9879,14 +9630,39 @@
                     <a:lstStyle/>
                     <a:p>
                       <a:r>
-                        <a:rPr lang="en-AU" sz="1100" dirty="0"/>
-                        <a:t>Background quantities</a:t>
-                      </a:r>
-                    </a:p>
-                    <a:p>
-                      <a:r>
-                        <a:rPr lang="en-AU" sz="1100" dirty="0"/>
-                        <a:t>Modal fitting</a:t>
+                        <a:rPr lang="en-AU" sz="900" dirty="0"/>
+                        <a:t>Read</a:t>
+                      </a:r>
+                    </a:p>
+                    <a:p>
+                      <a:r>
+                        <a:rPr lang="en-AU" sz="900" dirty="0"/>
+                        <a:t>Build structure</a:t>
+                      </a:r>
+                    </a:p>
+                    <a:p>
+                      <a:r>
+                        <a:rPr lang="en-AU" sz="900" dirty="0"/>
+                        <a:t>Add attributes</a:t>
+                      </a:r>
+                    </a:p>
+                    <a:p>
+                      <a:r>
+                        <a:rPr lang="en-AU" sz="900" dirty="0"/>
+                        <a:t>Calibrate</a:t>
+                      </a:r>
+                    </a:p>
+                    <a:p>
+                      <a:r>
+                        <a:rPr lang="en-AU" sz="900" dirty="0" err="1"/>
+                        <a:t>InOutWaterQC</a:t>
+                      </a:r>
+                      <a:endParaRPr lang="en-AU" sz="900" dirty="0"/>
+                    </a:p>
+                    <a:p>
+                      <a:r>
+                        <a:rPr lang="en-AU" sz="900" dirty="0"/>
+                        <a:t>Export</a:t>
                       </a:r>
                     </a:p>
                   </a:txBody>
@@ -9898,10 +9674,367 @@
                     <a:lstStyle/>
                     <a:p>
                       <a:r>
-                        <a:rPr lang="en-AU" sz="1100" dirty="0"/>
-                        <a:t>Modal/harmonic fitting</a:t>
-                      </a:r>
-                    </a:p>
+                        <a:rPr lang="en-AU" sz="900" dirty="0"/>
+                        <a:t>Read</a:t>
+                      </a:r>
+                    </a:p>
+                    <a:p>
+                      <a:r>
+                        <a:rPr lang="en-AU" sz="900" dirty="0"/>
+                        <a:t>Build structure</a:t>
+                      </a:r>
+                    </a:p>
+                    <a:p>
+                      <a:r>
+                        <a:rPr lang="en-AU" sz="900" dirty="0"/>
+                        <a:t>Add attributes</a:t>
+                      </a:r>
+                    </a:p>
+                    <a:p>
+                      <a:r>
+                        <a:rPr lang="en-AU" sz="900" dirty="0" err="1"/>
+                        <a:t>InOutWaterQC</a:t>
+                      </a:r>
+                      <a:endParaRPr lang="en-AU" sz="900" dirty="0"/>
+                    </a:p>
+                    <a:p>
+                      <a:r>
+                        <a:rPr lang="en-AU" sz="900" dirty="0" err="1"/>
+                        <a:t>TiltVelocitySimpleQC</a:t>
+                      </a:r>
+                      <a:endParaRPr lang="en-AU" sz="900" dirty="0"/>
+                    </a:p>
+                    <a:p>
+                      <a:r>
+                        <a:rPr lang="en-AU" sz="900" dirty="0" err="1"/>
+                        <a:t>EchoIntensitySimpleQC</a:t>
+                      </a:r>
+                      <a:endParaRPr lang="en-AU" sz="900" dirty="0"/>
+                    </a:p>
+                    <a:p>
+                      <a:r>
+                        <a:rPr lang="en-AU" sz="900" dirty="0" err="1"/>
+                        <a:t>ErrorVelocitySetQC</a:t>
+                      </a:r>
+                      <a:endParaRPr lang="en-AU" sz="900" dirty="0"/>
+                    </a:p>
+                    <a:p>
+                      <a:r>
+                        <a:rPr lang="en-AU" sz="900" dirty="0" err="1"/>
+                        <a:t>CorrMagVelocitySetQC</a:t>
+                      </a:r>
+                      <a:endParaRPr lang="en-AU" sz="900" dirty="0"/>
+                    </a:p>
+                    <a:p>
+                      <a:r>
+                        <a:rPr lang="en-AU" sz="900" dirty="0" err="1"/>
+                        <a:t>PercentGoodVelocitySetRDIQC</a:t>
+                      </a:r>
+                      <a:endParaRPr lang="en-AU" sz="900" dirty="0"/>
+                    </a:p>
+                    <a:p>
+                      <a:r>
+                        <a:rPr lang="en-AU" sz="900" dirty="0"/>
+                        <a:t>Export</a:t>
+                      </a:r>
+                    </a:p>
+                    <a:p>
+                      <a:r>
+                        <a:rPr lang="en-AU" sz="900" dirty="0">
+                          <a:solidFill>
+                            <a:srgbClr val="FF0000"/>
+                          </a:solidFill>
+                        </a:rPr>
+                        <a:t>NEED TO IMPLEMENT THE STANDARD FISH DETECTION</a:t>
+                      </a:r>
+                      <a:endParaRPr lang="en-AU" sz="900" dirty="0"/>
+                    </a:p>
+                  </a:txBody>
+                  <a:tcPr/>
+                </a:tc>
+                <a:tc>
+                  <a:txBody>
+                    <a:bodyPr/>
+                    <a:lstStyle/>
+                    <a:p>
+                      <a:r>
+                        <a:rPr lang="en-AU" sz="900" dirty="0"/>
+                        <a:t>Read</a:t>
+                      </a:r>
+                    </a:p>
+                    <a:p>
+                      <a:r>
+                        <a:rPr lang="en-AU" sz="900" dirty="0"/>
+                        <a:t>Build structure</a:t>
+                      </a:r>
+                    </a:p>
+                    <a:p>
+                      <a:r>
+                        <a:rPr lang="en-AU" sz="900" dirty="0"/>
+                        <a:t>Add attributes</a:t>
+                      </a:r>
+                    </a:p>
+                    <a:p>
+                      <a:r>
+                        <a:rPr lang="en-AU" sz="900" dirty="0" err="1"/>
+                        <a:t>InOutWaterQC</a:t>
+                      </a:r>
+                      <a:endParaRPr lang="en-AU" sz="900" dirty="0"/>
+                    </a:p>
+                    <a:p>
+                      <a:r>
+                        <a:rPr lang="en-AU" sz="900" dirty="0" err="1"/>
+                        <a:t>TiltVelocitySimpleQC</a:t>
+                      </a:r>
+                      <a:endParaRPr lang="en-AU" sz="900" dirty="0"/>
+                    </a:p>
+                    <a:p>
+                      <a:r>
+                        <a:rPr lang="en-AU" sz="900" dirty="0" err="1"/>
+                        <a:t>EchoIntensitySimpleQC</a:t>
+                      </a:r>
+                      <a:endParaRPr lang="en-AU" sz="900" dirty="0"/>
+                    </a:p>
+                    <a:p>
+                      <a:r>
+                        <a:rPr lang="en-AU" sz="900" dirty="0" err="1"/>
+                        <a:t>CorrMagVelocitySetQC</a:t>
+                      </a:r>
+                      <a:endParaRPr lang="en-AU" sz="900" dirty="0"/>
+                    </a:p>
+                    <a:p>
+                      <a:r>
+                        <a:rPr lang="en-AU" sz="900" dirty="0"/>
+                        <a:t>Export</a:t>
+                      </a:r>
+                      <a:endParaRPr lang="en-AU" sz="900" dirty="0">
+                        <a:solidFill>
+                          <a:srgbClr val="FF0000"/>
+                        </a:solidFill>
+                      </a:endParaRPr>
+                    </a:p>
+                    <a:p>
+                      <a:r>
+                        <a:rPr lang="en-AU" sz="900" dirty="0">
+                          <a:solidFill>
+                            <a:srgbClr val="FF0000"/>
+                          </a:solidFill>
+                        </a:rPr>
+                        <a:t>NEED TO IMPLEMENT THE ALONG-BEAM FISH DETECTION. </a:t>
+                      </a:r>
+                      <a:endParaRPr lang="en-AU" sz="900" dirty="0"/>
+                    </a:p>
+                  </a:txBody>
+                  <a:tcPr/>
+                </a:tc>
+                <a:tc>
+                  <a:txBody>
+                    <a:bodyPr/>
+                    <a:lstStyle/>
+                    <a:p>
+                      <a:r>
+                        <a:rPr lang="en-AU" sz="900" dirty="0"/>
+                        <a:t>Read</a:t>
+                      </a:r>
+                    </a:p>
+                    <a:p>
+                      <a:r>
+                        <a:rPr lang="en-AU" sz="900" dirty="0"/>
+                        <a:t>Build structure</a:t>
+                      </a:r>
+                    </a:p>
+                    <a:p>
+                      <a:r>
+                        <a:rPr lang="en-AU" sz="900" dirty="0"/>
+                        <a:t>Add attributes</a:t>
+                      </a:r>
+                    </a:p>
+                    <a:p>
+                      <a:r>
+                        <a:rPr lang="en-AU" sz="900" dirty="0" err="1"/>
+                        <a:t>InOutWaterQC</a:t>
+                      </a:r>
+                      <a:endParaRPr lang="en-AU" sz="900" dirty="0"/>
+                    </a:p>
+                    <a:p>
+                      <a:r>
+                        <a:rPr lang="en-AU" sz="900" dirty="0" err="1"/>
+                        <a:t>FishDetectionQC</a:t>
+                      </a:r>
+                      <a:endParaRPr lang="en-AU" sz="900" dirty="0"/>
+                    </a:p>
+                    <a:p>
+                      <a:r>
+                        <a:rPr lang="en-AU" sz="900" dirty="0" err="1"/>
+                        <a:t>CorrMagVelocitySetQC</a:t>
+                      </a:r>
+                      <a:endParaRPr lang="en-AU" sz="900" dirty="0"/>
+                    </a:p>
+                    <a:p>
+                      <a:r>
+                        <a:rPr lang="en-AU" sz="900" dirty="0"/>
+                        <a:t>export</a:t>
+                      </a:r>
+                      <a:endParaRPr lang="en-AU" sz="900" dirty="0">
+                        <a:solidFill>
+                          <a:srgbClr val="FF0000"/>
+                        </a:solidFill>
+                      </a:endParaRPr>
+                    </a:p>
+                    <a:p>
+                      <a:r>
+                        <a:rPr lang="en-AU" sz="900" dirty="0">
+                          <a:solidFill>
+                            <a:srgbClr val="FF0000"/>
+                          </a:solidFill>
+                        </a:rPr>
+                        <a:t>The 6019 tilt sensor was broken. Tilt data is </a:t>
+                      </a:r>
+                      <a:r>
+                        <a:rPr lang="en-AU" sz="900" dirty="0" err="1">
+                          <a:solidFill>
+                            <a:srgbClr val="FF0000"/>
+                          </a:solidFill>
+                        </a:rPr>
+                        <a:t>QCd</a:t>
+                      </a:r>
+                      <a:r>
+                        <a:rPr lang="en-AU" sz="900" dirty="0">
+                          <a:solidFill>
+                            <a:srgbClr val="FF0000"/>
+                          </a:solidFill>
+                        </a:rPr>
+                        <a:t> out manually and commented</a:t>
+                      </a:r>
+                    </a:p>
+                    <a:p>
+                      <a:endParaRPr lang="en-AU" sz="900" dirty="0">
+                        <a:solidFill>
+                          <a:srgbClr val="FF0000"/>
+                        </a:solidFill>
+                      </a:endParaRPr>
+                    </a:p>
+                    <a:p>
+                      <a:r>
+                        <a:rPr lang="en-AU" sz="900" dirty="0">
+                          <a:solidFill>
+                            <a:srgbClr val="FF0000"/>
+                          </a:solidFill>
+                        </a:rPr>
+                        <a:t>Frame interference? This is a bit of a bespoke step, calculated after turbulence calcs. Not sure where this should come in?</a:t>
+                      </a:r>
+                    </a:p>
+                  </a:txBody>
+                  <a:tcPr/>
+                </a:tc>
+                <a:tc>
+                  <a:txBody>
+                    <a:bodyPr/>
+                    <a:lstStyle/>
+                    <a:p>
+                      <a:r>
+                        <a:rPr lang="en-AU" sz="900" dirty="0"/>
+                        <a:t>Read</a:t>
+                      </a:r>
+                    </a:p>
+                    <a:p>
+                      <a:r>
+                        <a:rPr lang="en-AU" sz="900" dirty="0"/>
+                        <a:t>Build structure</a:t>
+                      </a:r>
+                    </a:p>
+                    <a:p>
+                      <a:r>
+                        <a:rPr lang="en-AU" sz="900" dirty="0"/>
+                        <a:t>Add attributes</a:t>
+                      </a:r>
+                    </a:p>
+                    <a:p>
+                      <a:r>
+                        <a:rPr lang="en-AU" sz="900" dirty="0"/>
+                        <a:t>_</a:t>
+                      </a:r>
+                      <a:r>
+                        <a:rPr lang="en-AU" sz="900" dirty="0" err="1"/>
+                        <a:t>calibrate_device</a:t>
+                      </a:r>
+                      <a:endParaRPr lang="en-AU" sz="900" dirty="0"/>
+                    </a:p>
+                    <a:p>
+                      <a:r>
+                        <a:rPr lang="en-AU" sz="900" dirty="0" err="1"/>
+                        <a:t>InOutWaterQC</a:t>
+                      </a:r>
+                      <a:endParaRPr lang="en-AU" sz="900" dirty="0"/>
+                    </a:p>
+                    <a:p>
+                      <a:r>
+                        <a:rPr lang="en-AU" sz="900" dirty="0"/>
+                        <a:t>export</a:t>
+                      </a:r>
+                    </a:p>
+                    <a:p>
+                      <a:endParaRPr lang="en-AU" sz="900" dirty="0"/>
+                    </a:p>
+                  </a:txBody>
+                  <a:tcPr/>
+                </a:tc>
+                <a:tc>
+                  <a:txBody>
+                    <a:bodyPr/>
+                    <a:lstStyle/>
+                    <a:p>
+                      <a:r>
+                        <a:rPr lang="en-AU" sz="900" dirty="0">
+                          <a:solidFill>
+                            <a:srgbClr val="FF0000"/>
+                          </a:solidFill>
+                        </a:rPr>
+                        <a:t>Need to implement CF compliance, associate </a:t>
+                      </a:r>
+                      <a:r>
+                        <a:rPr lang="en-AU" sz="900" dirty="0" err="1">
+                          <a:solidFill>
+                            <a:srgbClr val="FF0000"/>
+                          </a:solidFill>
+                        </a:rPr>
+                        <a:t>qc_flags</a:t>
+                      </a:r>
+                      <a:r>
+                        <a:rPr lang="en-AU" sz="900" dirty="0">
+                          <a:solidFill>
+                            <a:srgbClr val="FF0000"/>
+                          </a:solidFill>
+                        </a:rPr>
+                        <a:t> and add some auto </a:t>
+                      </a:r>
+                      <a:r>
+                        <a:rPr lang="en-AU" sz="900" dirty="0" err="1">
+                          <a:solidFill>
+                            <a:srgbClr val="FF0000"/>
+                          </a:solidFill>
+                        </a:rPr>
+                        <a:t>qc_routines</a:t>
+                      </a:r>
+                      <a:r>
+                        <a:rPr lang="en-AU" sz="900" dirty="0">
+                          <a:solidFill>
+                            <a:srgbClr val="FF0000"/>
+                          </a:solidFill>
+                        </a:rPr>
+                        <a:t>. </a:t>
+                      </a:r>
+                    </a:p>
+                    <a:p>
+                      <a:endParaRPr lang="en-AU" sz="900" dirty="0"/>
+                    </a:p>
+                  </a:txBody>
+                  <a:tcPr/>
+                </a:tc>
+                <a:tc>
+                  <a:txBody>
+                    <a:bodyPr/>
+                    <a:lstStyle/>
                     <a:p>
                       <a:pPr marL="0" marR="0" lvl="0" indent="0" algn="l" defTabSz="914400" rtl="0" eaLnBrk="1" fontAlgn="auto" latinLnBrk="0" hangingPunct="1">
                         <a:lnSpc>
@@ -9921,15 +10054,48 @@
                         <a:defRPr/>
                       </a:pPr>
                       <a:r>
-                        <a:rPr lang="en-AU" sz="1100" dirty="0"/>
-                        <a:t>Velocity shear calcs</a:t>
-                      </a:r>
-                    </a:p>
-                    <a:p>
-                      <a:r>
-                        <a:rPr lang="en-AU" sz="1100" dirty="0"/>
-                        <a:t>Scotti et al. 2005?</a:t>
-                      </a:r>
+                        <a:rPr lang="en-AU" sz="900" dirty="0">
+                          <a:solidFill>
+                            <a:srgbClr val="FF0000"/>
+                          </a:solidFill>
+                        </a:rPr>
+                        <a:t>Need to implement CF compliance, associate </a:t>
+                      </a:r>
+                      <a:r>
+                        <a:rPr lang="en-AU" sz="900" dirty="0" err="1">
+                          <a:solidFill>
+                            <a:srgbClr val="FF0000"/>
+                          </a:solidFill>
+                        </a:rPr>
+                        <a:t>qc_flags</a:t>
+                      </a:r>
+                      <a:r>
+                        <a:rPr lang="en-AU" sz="900" dirty="0">
+                          <a:solidFill>
+                            <a:srgbClr val="FF0000"/>
+                          </a:solidFill>
+                        </a:rPr>
+                        <a:t> and add some auto </a:t>
+                      </a:r>
+                      <a:r>
+                        <a:rPr lang="en-AU" sz="900" dirty="0" err="1">
+                          <a:solidFill>
+                            <a:srgbClr val="FF0000"/>
+                          </a:solidFill>
+                        </a:rPr>
+                        <a:t>qc_routines</a:t>
+                      </a:r>
+                      <a:r>
+                        <a:rPr lang="en-AU" sz="900" dirty="0">
+                          <a:solidFill>
+                            <a:srgbClr val="FF0000"/>
+                          </a:solidFill>
+                        </a:rPr>
+                        <a:t>. </a:t>
+                      </a:r>
+                    </a:p>
+                    <a:p>
+                      <a:endParaRPr lang="en-AU" sz="900" dirty="0"/>
                     </a:p>
                   </a:txBody>
                   <a:tcPr/>
@@ -9940,21 +10106,121 @@
                     <a:lstStyle/>
                     <a:p>
                       <a:r>
-                        <a:rPr lang="en-AU" sz="1100" dirty="0"/>
-                        <a:t>Turbulence calcs</a:t>
-                      </a:r>
-                    </a:p>
-                    <a:p>
-                      <a:r>
-                        <a:rPr lang="en-AU" sz="1100" dirty="0"/>
-                        <a:t>Velocity shear calcs</a:t>
-                      </a:r>
-                    </a:p>
-                    <a:p>
-                      <a:r>
-                        <a:rPr lang="en-AU" sz="1100" dirty="0"/>
-                        <a:t>Scotti et al. 2005</a:t>
-                      </a:r>
+                        <a:rPr lang="en-AU" sz="900" b="1" dirty="0">
+                          <a:solidFill>
+                            <a:schemeClr val="accent2">
+                              <a:lumMod val="75000"/>
+                            </a:schemeClr>
+                          </a:solidFill>
+                        </a:rPr>
+                        <a:t>Deconvolve?</a:t>
+                      </a:r>
+                    </a:p>
+                    <a:p>
+                      <a:endParaRPr lang="en-AU" sz="900" dirty="0">
+                        <a:solidFill>
+                          <a:srgbClr val="FF0000"/>
+                        </a:solidFill>
+                      </a:endParaRPr>
+                    </a:p>
+                    <a:p>
+                      <a:r>
+                        <a:rPr lang="en-AU" sz="900" dirty="0">
+                          <a:solidFill>
+                            <a:srgbClr val="FF0000"/>
+                          </a:solidFill>
+                        </a:rPr>
+                        <a:t>Need to check </a:t>
+                      </a:r>
+                      <a:r>
+                        <a:rPr lang="en-AU" sz="900" dirty="0" err="1">
+                          <a:solidFill>
+                            <a:srgbClr val="FF0000"/>
+                          </a:solidFill>
+                        </a:rPr>
+                        <a:t>pyODAS</a:t>
+                      </a:r>
+                      <a:r>
+                        <a:rPr lang="en-AU" sz="900" dirty="0">
+                          <a:solidFill>
+                            <a:srgbClr val="FF0000"/>
+                          </a:solidFill>
+                        </a:rPr>
+                        <a:t> actually works – never was rigorously tested. </a:t>
+                      </a:r>
+                    </a:p>
+                    <a:p>
+                      <a:endParaRPr lang="en-AU" sz="900" dirty="0">
+                        <a:solidFill>
+                          <a:srgbClr val="FF0000"/>
+                        </a:solidFill>
+                      </a:endParaRPr>
+                    </a:p>
+                    <a:p>
+                      <a:pPr marL="0" marR="0" lvl="0" indent="0" algn="l" defTabSz="914400" rtl="0" eaLnBrk="1" fontAlgn="auto" latinLnBrk="0" hangingPunct="1">
+                        <a:lnSpc>
+                          <a:spcPct val="100000"/>
+                        </a:lnSpc>
+                        <a:spcBef>
+                          <a:spcPts val="0"/>
+                        </a:spcBef>
+                        <a:spcAft>
+                          <a:spcPts val="0"/>
+                        </a:spcAft>
+                        <a:buClrTx/>
+                        <a:buSzTx/>
+                        <a:buFontTx/>
+                        <a:buNone/>
+                        <a:tabLst/>
+                        <a:defRPr/>
+                      </a:pPr>
+                      <a:r>
+                        <a:rPr lang="en-AU" sz="900" dirty="0">
+                          <a:solidFill>
+                            <a:srgbClr val="FF0000"/>
+                          </a:solidFill>
+                        </a:rPr>
+                        <a:t>Need to implement CF compliance, associate </a:t>
+                      </a:r>
+                      <a:r>
+                        <a:rPr lang="en-AU" sz="900" dirty="0" err="1">
+                          <a:solidFill>
+                            <a:srgbClr val="FF0000"/>
+                          </a:solidFill>
+                        </a:rPr>
+                        <a:t>qc_flags</a:t>
+                      </a:r>
+                      <a:r>
+                        <a:rPr lang="en-AU" sz="900" dirty="0">
+                          <a:solidFill>
+                            <a:srgbClr val="FF0000"/>
+                          </a:solidFill>
+                        </a:rPr>
+                        <a:t> and add some auto </a:t>
+                      </a:r>
+                      <a:r>
+                        <a:rPr lang="en-AU" sz="900" dirty="0" err="1">
+                          <a:solidFill>
+                            <a:srgbClr val="FF0000"/>
+                          </a:solidFill>
+                        </a:rPr>
+                        <a:t>qc_routines</a:t>
+                      </a:r>
+                      <a:r>
+                        <a:rPr lang="en-AU" sz="900" dirty="0">
+                          <a:solidFill>
+                            <a:srgbClr val="FF0000"/>
+                          </a:solidFill>
+                        </a:rPr>
+                        <a:t>. </a:t>
+                      </a:r>
+                    </a:p>
+                    <a:p>
+                      <a:endParaRPr lang="en-AU" sz="900" dirty="0">
+                        <a:solidFill>
+                          <a:srgbClr val="FF0000"/>
+                        </a:solidFill>
+                      </a:endParaRPr>
                     </a:p>
                   </a:txBody>
                   <a:tcPr/>
@@ -9964,9 +10230,26 @@
                     <a:bodyPr/>
                     <a:lstStyle/>
                     <a:p>
-                      <a:r>
-                        <a:rPr lang="en-AU" sz="1100" dirty="0"/>
-                        <a:t>Turbulence Calcs</a:t>
+                      <a:endParaRPr lang="en-AU" sz="900" dirty="0"/>
+                    </a:p>
+                  </a:txBody>
+                  <a:tcPr/>
+                </a:tc>
+                <a:extLst>
+                  <a:ext uri="{0D108BD9-81ED-4DB2-BD59-A6C34878D82A}">
+                    <a16:rowId xmlns:a16="http://schemas.microsoft.com/office/drawing/2014/main" val="2323022161"/>
+                  </a:ext>
+                </a:extLst>
+              </a:tr>
+              <a:tr h="856714">
+                <a:tc>
+                  <a:txBody>
+                    <a:bodyPr/>
+                    <a:lstStyle/>
+                    <a:p>
+                      <a:r>
+                        <a:rPr lang="en-AU" sz="900" dirty="0"/>
+                        <a:t>2</a:t>
                       </a:r>
                     </a:p>
                   </a:txBody>
@@ -9977,7 +10260,94 @@
                     <a:bodyPr/>
                     <a:lstStyle/>
                     <a:p>
-                      <a:endParaRPr lang="en-AU" sz="1100" dirty="0"/>
+                      <a:pPr marL="0" marR="0" lvl="0" indent="0" algn="l" defTabSz="914400" rtl="0" eaLnBrk="1" fontAlgn="auto" latinLnBrk="0" hangingPunct="1">
+                        <a:lnSpc>
+                          <a:spcPct val="100000"/>
+                        </a:lnSpc>
+                        <a:spcBef>
+                          <a:spcPts val="0"/>
+                        </a:spcBef>
+                        <a:spcAft>
+                          <a:spcPts val="0"/>
+                        </a:spcAft>
+                        <a:buClrTx/>
+                        <a:buSzTx/>
+                        <a:buFontTx/>
+                        <a:buNone/>
+                        <a:tabLst/>
+                        <a:defRPr/>
+                      </a:pPr>
+                      <a:r>
+                        <a:rPr lang="en-AU" sz="900" dirty="0">
+                          <a:solidFill>
+                            <a:schemeClr val="accent5">
+                              <a:lumMod val="75000"/>
+                            </a:schemeClr>
+                          </a:solidFill>
+                        </a:rPr>
+                        <a:t>Goring </a:t>
+                      </a:r>
+                      <a:r>
+                        <a:rPr lang="en-AU" sz="900" dirty="0" err="1">
+                          <a:solidFill>
+                            <a:schemeClr val="accent5">
+                              <a:lumMod val="75000"/>
+                            </a:schemeClr>
+                          </a:solidFill>
+                        </a:rPr>
+                        <a:t>Nikora</a:t>
+                      </a:r>
+                      <a:r>
+                        <a:rPr lang="en-AU" sz="900" dirty="0">
+                          <a:solidFill>
+                            <a:schemeClr val="accent5">
+                              <a:lumMod val="75000"/>
+                            </a:schemeClr>
+                          </a:solidFill>
+                        </a:rPr>
+                        <a:t>?</a:t>
+                      </a:r>
+                    </a:p>
+                    <a:p>
+                      <a:pPr marL="0" marR="0" lvl="0" indent="0" algn="l" defTabSz="914400" rtl="0" eaLnBrk="1" fontAlgn="auto" latinLnBrk="0" hangingPunct="1">
+                        <a:lnSpc>
+                          <a:spcPct val="100000"/>
+                        </a:lnSpc>
+                        <a:spcBef>
+                          <a:spcPts val="0"/>
+                        </a:spcBef>
+                        <a:spcAft>
+                          <a:spcPts val="0"/>
+                        </a:spcAft>
+                        <a:buClrTx/>
+                        <a:buSzTx/>
+                        <a:buFontTx/>
+                        <a:buNone/>
+                        <a:tabLst/>
+                        <a:defRPr/>
+                      </a:pPr>
+                      <a:r>
+                        <a:rPr lang="en-AU" sz="900" dirty="0">
+                          <a:solidFill>
+                            <a:schemeClr val="accent5">
+                              <a:lumMod val="75000"/>
+                            </a:schemeClr>
+                          </a:solidFill>
+                        </a:rPr>
+                        <a:t>Time filter/align</a:t>
+                      </a:r>
+                    </a:p>
+                    <a:p>
+                      <a:r>
+                        <a:rPr lang="en-AU" sz="900" dirty="0">
+                          <a:solidFill>
+                            <a:schemeClr val="accent5">
+                              <a:lumMod val="75000"/>
+                            </a:schemeClr>
+                          </a:solidFill>
+                        </a:rPr>
+                        <a:t>Stack Moorings</a:t>
+                      </a:r>
                     </a:p>
                   </a:txBody>
                   <a:tcPr/>
@@ -9987,7 +10357,653 @@
                     <a:bodyPr/>
                     <a:lstStyle/>
                     <a:p>
-                      <a:endParaRPr lang="en-AU" sz="1100" dirty="0"/>
+                      <a:r>
+                        <a:rPr lang="en-AU" sz="900" dirty="0">
+                          <a:solidFill>
+                            <a:schemeClr val="accent5">
+                              <a:lumMod val="75000"/>
+                            </a:schemeClr>
+                          </a:solidFill>
+                        </a:rPr>
+                        <a:t>ENU with </a:t>
+                      </a:r>
+                      <a:r>
+                        <a:rPr lang="en-AU" sz="900" dirty="0" err="1">
+                          <a:solidFill>
+                            <a:schemeClr val="accent5">
+                              <a:lumMod val="75000"/>
+                            </a:schemeClr>
+                          </a:solidFill>
+                        </a:rPr>
+                        <a:t>BinMap</a:t>
+                      </a:r>
+                      <a:endParaRPr lang="en-AU" sz="900" dirty="0">
+                        <a:solidFill>
+                          <a:schemeClr val="accent5">
+                            <a:lumMod val="75000"/>
+                          </a:schemeClr>
+                        </a:solidFill>
+                      </a:endParaRPr>
+                    </a:p>
+                    <a:p>
+                      <a:r>
+                        <a:rPr lang="en-AU" sz="900" dirty="0">
+                          <a:solidFill>
+                            <a:schemeClr val="accent5">
+                              <a:lumMod val="75000"/>
+                            </a:schemeClr>
+                          </a:solidFill>
+                        </a:rPr>
+                        <a:t>Time filter/align</a:t>
+                      </a:r>
+                    </a:p>
+                    <a:p>
+                      <a:r>
+                        <a:rPr lang="en-AU" sz="900" dirty="0">
+                          <a:solidFill>
+                            <a:schemeClr val="accent5">
+                              <a:lumMod val="75000"/>
+                            </a:schemeClr>
+                          </a:solidFill>
+                        </a:rPr>
+                        <a:t>Replace missing data</a:t>
+                      </a:r>
+                    </a:p>
+                    <a:p>
+                      <a:r>
+                        <a:rPr lang="en-AU" sz="900" dirty="0">
+                          <a:solidFill>
+                            <a:schemeClr val="accent5">
+                              <a:lumMod val="75000"/>
+                            </a:schemeClr>
+                          </a:solidFill>
+                        </a:rPr>
+                        <a:t>Stack moorings</a:t>
+                      </a:r>
+                    </a:p>
+                  </a:txBody>
+                  <a:tcPr/>
+                </a:tc>
+                <a:tc>
+                  <a:txBody>
+                    <a:bodyPr/>
+                    <a:lstStyle/>
+                    <a:p>
+                      <a:r>
+                        <a:rPr lang="en-AU" sz="900" dirty="0">
+                          <a:solidFill>
+                            <a:schemeClr val="accent5">
+                              <a:lumMod val="75000"/>
+                            </a:schemeClr>
+                          </a:solidFill>
+                        </a:rPr>
+                        <a:t>ENU</a:t>
+                      </a:r>
+                    </a:p>
+                    <a:p>
+                      <a:r>
+                        <a:rPr lang="en-AU" sz="900" dirty="0">
+                          <a:solidFill>
+                            <a:schemeClr val="accent5">
+                              <a:lumMod val="75000"/>
+                            </a:schemeClr>
+                          </a:solidFill>
+                        </a:rPr>
+                        <a:t>Phase unwrap</a:t>
+                      </a:r>
+                    </a:p>
+                    <a:p>
+                      <a:r>
+                        <a:rPr lang="en-AU" sz="900" dirty="0">
+                          <a:solidFill>
+                            <a:schemeClr val="accent5">
+                              <a:lumMod val="75000"/>
+                            </a:schemeClr>
+                          </a:solidFill>
+                        </a:rPr>
+                        <a:t>Replace missing data</a:t>
+                      </a:r>
+                    </a:p>
+                    <a:p>
+                      <a:r>
+                        <a:rPr lang="en-AU" sz="900" b="0" dirty="0">
+                          <a:solidFill>
+                            <a:srgbClr val="FF0000"/>
+                          </a:solidFill>
+                        </a:rPr>
+                        <a:t>SIGNATURE BIN MAP NOT IMPLEMENTED</a:t>
+                      </a:r>
+                    </a:p>
+                  </a:txBody>
+                  <a:tcPr/>
+                </a:tc>
+                <a:tc>
+                  <a:txBody>
+                    <a:bodyPr/>
+                    <a:lstStyle/>
+                    <a:p>
+                      <a:r>
+                        <a:rPr lang="en-AU" sz="900" dirty="0">
+                          <a:solidFill>
+                            <a:schemeClr val="accent5">
+                              <a:lumMod val="75000"/>
+                            </a:schemeClr>
+                          </a:solidFill>
+                        </a:rPr>
+                        <a:t>Replace missing</a:t>
+                      </a:r>
+                    </a:p>
+                    <a:p>
+                      <a:r>
+                        <a:rPr lang="en-AU" sz="900" dirty="0">
+                          <a:solidFill>
+                            <a:schemeClr val="accent5">
+                              <a:lumMod val="75000"/>
+                            </a:schemeClr>
+                          </a:solidFill>
+                        </a:rPr>
+                        <a:t>Phase unwrap</a:t>
+                      </a:r>
+                    </a:p>
+                    <a:p>
+                      <a:pPr marL="0" marR="0" lvl="0" indent="0" algn="l" defTabSz="914400" rtl="0" eaLnBrk="1" fontAlgn="auto" latinLnBrk="0" hangingPunct="1">
+                        <a:lnSpc>
+                          <a:spcPct val="100000"/>
+                        </a:lnSpc>
+                        <a:spcBef>
+                          <a:spcPts val="0"/>
+                        </a:spcBef>
+                        <a:spcAft>
+                          <a:spcPts val="0"/>
+                        </a:spcAft>
+                        <a:buClrTx/>
+                        <a:buSzTx/>
+                        <a:buFontTx/>
+                        <a:buNone/>
+                        <a:tabLst/>
+                        <a:defRPr/>
+                      </a:pPr>
+                      <a:r>
+                        <a:rPr lang="en-AU" sz="900" dirty="0">
+                          <a:solidFill>
+                            <a:schemeClr val="accent5">
+                              <a:lumMod val="75000"/>
+                            </a:schemeClr>
+                          </a:solidFill>
+                        </a:rPr>
+                        <a:t>Goring </a:t>
+                      </a:r>
+                      <a:r>
+                        <a:rPr lang="en-AU" sz="900" dirty="0" err="1">
+                          <a:solidFill>
+                            <a:schemeClr val="accent5">
+                              <a:lumMod val="75000"/>
+                            </a:schemeClr>
+                          </a:solidFill>
+                        </a:rPr>
+                        <a:t>Nikora</a:t>
+                      </a:r>
+                      <a:r>
+                        <a:rPr lang="en-AU" sz="900" dirty="0">
+                          <a:solidFill>
+                            <a:schemeClr val="accent5">
+                              <a:lumMod val="75000"/>
+                            </a:schemeClr>
+                          </a:solidFill>
+                        </a:rPr>
+                        <a:t>?</a:t>
+                      </a:r>
+                    </a:p>
+                    <a:p>
+                      <a:endParaRPr lang="en-AU" sz="900" dirty="0">
+                        <a:solidFill>
+                          <a:schemeClr val="accent5">
+                            <a:lumMod val="75000"/>
+                          </a:schemeClr>
+                        </a:solidFill>
+                      </a:endParaRPr>
+                    </a:p>
+                  </a:txBody>
+                  <a:tcPr/>
+                </a:tc>
+                <a:tc>
+                  <a:txBody>
+                    <a:bodyPr/>
+                    <a:lstStyle/>
+                    <a:p>
+                      <a:r>
+                        <a:rPr lang="en-AU" sz="900" dirty="0">
+                          <a:solidFill>
+                            <a:schemeClr val="accent5">
+                              <a:lumMod val="75000"/>
+                            </a:schemeClr>
+                          </a:solidFill>
+                        </a:rPr>
+                        <a:t>Burst Median? </a:t>
+                      </a:r>
+                    </a:p>
+                    <a:p>
+                      <a:pPr marL="0" marR="0" lvl="0" indent="0" algn="l" defTabSz="914400" rtl="0" eaLnBrk="1" fontAlgn="auto" latinLnBrk="0" hangingPunct="1">
+                        <a:lnSpc>
+                          <a:spcPct val="100000"/>
+                        </a:lnSpc>
+                        <a:spcBef>
+                          <a:spcPts val="0"/>
+                        </a:spcBef>
+                        <a:spcAft>
+                          <a:spcPts val="0"/>
+                        </a:spcAft>
+                        <a:buClrTx/>
+                        <a:buSzTx/>
+                        <a:buFontTx/>
+                        <a:buNone/>
+                        <a:tabLst/>
+                        <a:defRPr/>
+                      </a:pPr>
+                      <a:r>
+                        <a:rPr lang="en-AU" sz="900" dirty="0">
+                          <a:solidFill>
+                            <a:schemeClr val="accent5">
+                              <a:lumMod val="75000"/>
+                            </a:schemeClr>
+                          </a:solidFill>
+                        </a:rPr>
+                        <a:t>Goring </a:t>
+                      </a:r>
+                      <a:r>
+                        <a:rPr lang="en-AU" sz="900" dirty="0" err="1">
+                          <a:solidFill>
+                            <a:schemeClr val="accent5">
+                              <a:lumMod val="75000"/>
+                            </a:schemeClr>
+                          </a:solidFill>
+                        </a:rPr>
+                        <a:t>Nikora</a:t>
+                      </a:r>
+                      <a:r>
+                        <a:rPr lang="en-AU" sz="900" dirty="0">
+                          <a:solidFill>
+                            <a:schemeClr val="accent5">
+                              <a:lumMod val="75000"/>
+                            </a:schemeClr>
+                          </a:solidFill>
+                        </a:rPr>
+                        <a:t>?</a:t>
+                      </a:r>
+                    </a:p>
+                    <a:p>
+                      <a:endParaRPr lang="en-AU" sz="900" dirty="0"/>
+                    </a:p>
+                  </a:txBody>
+                  <a:tcPr/>
+                </a:tc>
+                <a:tc>
+                  <a:txBody>
+                    <a:bodyPr/>
+                    <a:lstStyle/>
+                    <a:p>
+                      <a:endParaRPr lang="en-AU" sz="900" dirty="0"/>
+                    </a:p>
+                  </a:txBody>
+                  <a:tcPr/>
+                </a:tc>
+                <a:tc>
+                  <a:txBody>
+                    <a:bodyPr/>
+                    <a:lstStyle/>
+                    <a:p>
+                      <a:r>
+                        <a:rPr lang="en-AU" sz="900" b="0" dirty="0">
+                          <a:solidFill>
+                            <a:schemeClr val="accent5">
+                              <a:lumMod val="75000"/>
+                            </a:schemeClr>
+                          </a:solidFill>
+                        </a:rPr>
+                        <a:t>Transect</a:t>
+                      </a:r>
+                    </a:p>
+                    <a:p>
+                      <a:endParaRPr lang="en-AU" sz="900" dirty="0"/>
+                    </a:p>
+                  </a:txBody>
+                  <a:tcPr/>
+                </a:tc>
+                <a:tc>
+                  <a:txBody>
+                    <a:bodyPr/>
+                    <a:lstStyle/>
+                    <a:p>
+                      <a:pPr marL="0" marR="0" lvl="0" indent="0" algn="l" defTabSz="914400" rtl="0" eaLnBrk="1" fontAlgn="auto" latinLnBrk="0" hangingPunct="1">
+                        <a:lnSpc>
+                          <a:spcPct val="100000"/>
+                        </a:lnSpc>
+                        <a:spcBef>
+                          <a:spcPts val="0"/>
+                        </a:spcBef>
+                        <a:spcAft>
+                          <a:spcPts val="0"/>
+                        </a:spcAft>
+                        <a:buClrTx/>
+                        <a:buSzTx/>
+                        <a:buFontTx/>
+                        <a:buNone/>
+                        <a:tabLst/>
+                        <a:defRPr/>
+                      </a:pPr>
+                      <a:r>
+                        <a:rPr lang="en-AU" sz="900" dirty="0">
+                          <a:solidFill>
+                            <a:schemeClr val="accent5">
+                              <a:lumMod val="75000"/>
+                            </a:schemeClr>
+                          </a:solidFill>
+                        </a:rPr>
+                        <a:t>Replace missing</a:t>
+                      </a:r>
+                    </a:p>
+                    <a:p>
+                      <a:pPr marL="0" marR="0" lvl="0" indent="0" algn="l" defTabSz="914400" rtl="0" eaLnBrk="1" fontAlgn="auto" latinLnBrk="0" hangingPunct="1">
+                        <a:lnSpc>
+                          <a:spcPct val="100000"/>
+                        </a:lnSpc>
+                        <a:spcBef>
+                          <a:spcPts val="0"/>
+                        </a:spcBef>
+                        <a:spcAft>
+                          <a:spcPts val="0"/>
+                        </a:spcAft>
+                        <a:buClrTx/>
+                        <a:buSzTx/>
+                        <a:buFontTx/>
+                        <a:buNone/>
+                        <a:tabLst/>
+                        <a:defRPr/>
+                      </a:pPr>
+                      <a:r>
+                        <a:rPr lang="en-AU" sz="900" dirty="0">
+                          <a:solidFill>
+                            <a:schemeClr val="accent5">
+                              <a:lumMod val="75000"/>
+                            </a:schemeClr>
+                          </a:solidFill>
+                        </a:rPr>
+                        <a:t>Goring </a:t>
+                      </a:r>
+                      <a:r>
+                        <a:rPr lang="en-AU" sz="900" dirty="0" err="1">
+                          <a:solidFill>
+                            <a:schemeClr val="accent5">
+                              <a:lumMod val="75000"/>
+                            </a:schemeClr>
+                          </a:solidFill>
+                        </a:rPr>
+                        <a:t>Nikora</a:t>
+                      </a:r>
+                      <a:r>
+                        <a:rPr lang="en-AU" sz="900" dirty="0">
+                          <a:solidFill>
+                            <a:schemeClr val="accent5">
+                              <a:lumMod val="75000"/>
+                            </a:schemeClr>
+                          </a:solidFill>
+                        </a:rPr>
+                        <a:t>?</a:t>
+                      </a:r>
+                    </a:p>
+                    <a:p>
+                      <a:endParaRPr lang="en-AU" sz="900" dirty="0">
+                        <a:solidFill>
+                          <a:schemeClr val="accent5">
+                            <a:lumMod val="75000"/>
+                          </a:schemeClr>
+                        </a:solidFill>
+                      </a:endParaRPr>
+                    </a:p>
+                    <a:p>
+                      <a:endParaRPr lang="en-AU" sz="900" dirty="0"/>
+                    </a:p>
+                  </a:txBody>
+                  <a:tcPr/>
+                </a:tc>
+                <a:tc>
+                  <a:txBody>
+                    <a:bodyPr/>
+                    <a:lstStyle/>
+                    <a:p>
+                      <a:endParaRPr lang="en-AU" sz="900" dirty="0"/>
+                    </a:p>
+                  </a:txBody>
+                  <a:tcPr/>
+                </a:tc>
+                <a:extLst>
+                  <a:ext uri="{0D108BD9-81ED-4DB2-BD59-A6C34878D82A}">
+                    <a16:rowId xmlns:a16="http://schemas.microsoft.com/office/drawing/2014/main" val="1001779354"/>
+                  </a:ext>
+                </a:extLst>
+              </a:tr>
+              <a:tr h="650209">
+                <a:tc>
+                  <a:txBody>
+                    <a:bodyPr/>
+                    <a:lstStyle/>
+                    <a:p>
+                      <a:r>
+                        <a:rPr lang="en-AU" sz="900" dirty="0"/>
+                        <a:t>3</a:t>
+                      </a:r>
+                    </a:p>
+                  </a:txBody>
+                  <a:tcPr/>
+                </a:tc>
+                <a:tc>
+                  <a:txBody>
+                    <a:bodyPr/>
+                    <a:lstStyle/>
+                    <a:p>
+                      <a:r>
+                        <a:rPr lang="en-AU" sz="900" dirty="0">
+                          <a:solidFill>
+                            <a:schemeClr val="accent5">
+                              <a:lumMod val="75000"/>
+                            </a:schemeClr>
+                          </a:solidFill>
+                        </a:rPr>
+                        <a:t>Background quantities</a:t>
+                      </a:r>
+                    </a:p>
+                    <a:p>
+                      <a:r>
+                        <a:rPr lang="en-AU" sz="900" dirty="0">
+                          <a:solidFill>
+                            <a:schemeClr val="accent5">
+                              <a:lumMod val="75000"/>
+                            </a:schemeClr>
+                          </a:solidFill>
+                        </a:rPr>
+                        <a:t>Modal fitting</a:t>
+                      </a:r>
+                    </a:p>
+                  </a:txBody>
+                  <a:tcPr/>
+                </a:tc>
+                <a:tc>
+                  <a:txBody>
+                    <a:bodyPr/>
+                    <a:lstStyle/>
+                    <a:p>
+                      <a:r>
+                        <a:rPr lang="en-AU" sz="900" dirty="0">
+                          <a:solidFill>
+                            <a:schemeClr val="accent5">
+                              <a:lumMod val="75000"/>
+                            </a:schemeClr>
+                          </a:solidFill>
+                        </a:rPr>
+                        <a:t>Modal/harmonic fitting</a:t>
+                      </a:r>
+                    </a:p>
+                    <a:p>
+                      <a:pPr marL="0" marR="0" lvl="0" indent="0" algn="l" defTabSz="914400" rtl="0" eaLnBrk="1" fontAlgn="auto" latinLnBrk="0" hangingPunct="1">
+                        <a:lnSpc>
+                          <a:spcPct val="100000"/>
+                        </a:lnSpc>
+                        <a:spcBef>
+                          <a:spcPts val="0"/>
+                        </a:spcBef>
+                        <a:spcAft>
+                          <a:spcPts val="0"/>
+                        </a:spcAft>
+                        <a:buClrTx/>
+                        <a:buSzTx/>
+                        <a:buFontTx/>
+                        <a:buNone/>
+                        <a:tabLst/>
+                        <a:defRPr/>
+                      </a:pPr>
+                      <a:r>
+                        <a:rPr lang="en-AU" sz="900" dirty="0">
+                          <a:solidFill>
+                            <a:schemeClr val="accent5">
+                              <a:lumMod val="75000"/>
+                            </a:schemeClr>
+                          </a:solidFill>
+                        </a:rPr>
+                        <a:t>Velocity shear calcs</a:t>
+                      </a:r>
+                    </a:p>
+                    <a:p>
+                      <a:r>
+                        <a:rPr lang="en-AU" sz="900" dirty="0">
+                          <a:solidFill>
+                            <a:schemeClr val="accent5">
+                              <a:lumMod val="75000"/>
+                            </a:schemeClr>
+                          </a:solidFill>
+                        </a:rPr>
+                        <a:t>Scotti et al. 2005?</a:t>
+                      </a:r>
+                    </a:p>
+                  </a:txBody>
+                  <a:tcPr/>
+                </a:tc>
+                <a:tc>
+                  <a:txBody>
+                    <a:bodyPr/>
+                    <a:lstStyle/>
+                    <a:p>
+                      <a:r>
+                        <a:rPr lang="en-AU" sz="900" dirty="0">
+                          <a:solidFill>
+                            <a:schemeClr val="accent5">
+                              <a:lumMod val="75000"/>
+                            </a:schemeClr>
+                          </a:solidFill>
+                        </a:rPr>
+                        <a:t>Turbulence calcs</a:t>
+                      </a:r>
+                    </a:p>
+                    <a:p>
+                      <a:r>
+                        <a:rPr lang="en-AU" sz="900" dirty="0">
+                          <a:solidFill>
+                            <a:schemeClr val="accent5">
+                              <a:lumMod val="75000"/>
+                            </a:schemeClr>
+                          </a:solidFill>
+                        </a:rPr>
+                        <a:t>Velocity shear calcs</a:t>
+                      </a:r>
+                    </a:p>
+                    <a:p>
+                      <a:r>
+                        <a:rPr lang="en-AU" sz="900" dirty="0">
+                          <a:solidFill>
+                            <a:schemeClr val="accent5">
+                              <a:lumMod val="75000"/>
+                            </a:schemeClr>
+                          </a:solidFill>
+                        </a:rPr>
+                        <a:t>Scotti et al. 2005</a:t>
+                      </a:r>
+                    </a:p>
+                  </a:txBody>
+                  <a:tcPr/>
+                </a:tc>
+                <a:tc>
+                  <a:txBody>
+                    <a:bodyPr/>
+                    <a:lstStyle/>
+                    <a:p>
+                      <a:r>
+                        <a:rPr lang="en-AU" sz="900" dirty="0">
+                          <a:solidFill>
+                            <a:schemeClr val="accent5">
+                              <a:lumMod val="75000"/>
+                            </a:schemeClr>
+                          </a:solidFill>
+                        </a:rPr>
+                        <a:t>Turbulence Calcs</a:t>
+                      </a:r>
+                    </a:p>
+                  </a:txBody>
+                  <a:tcPr/>
+                </a:tc>
+                <a:tc>
+                  <a:txBody>
+                    <a:bodyPr/>
+                    <a:lstStyle/>
+                    <a:p>
+                      <a:endParaRPr lang="en-AU" sz="900" dirty="0"/>
+                    </a:p>
+                  </a:txBody>
+                  <a:tcPr/>
+                </a:tc>
+                <a:tc>
+                  <a:txBody>
+                    <a:bodyPr/>
+                    <a:lstStyle/>
+                    <a:p>
+                      <a:endParaRPr lang="en-AU" sz="900" dirty="0"/>
+                    </a:p>
+                  </a:txBody>
+                  <a:tcPr/>
+                </a:tc>
+                <a:tc>
+                  <a:txBody>
+                    <a:bodyPr/>
+                    <a:lstStyle/>
+                    <a:p>
+                      <a:endParaRPr lang="en-AU" sz="900" dirty="0"/>
+                    </a:p>
+                  </a:txBody>
+                  <a:tcPr/>
+                </a:tc>
+                <a:tc>
+                  <a:txBody>
+                    <a:bodyPr/>
+                    <a:lstStyle/>
+                    <a:p>
+                      <a:r>
+                        <a:rPr lang="en-AU" sz="900" dirty="0">
+                          <a:solidFill>
+                            <a:schemeClr val="accent5">
+                              <a:lumMod val="75000"/>
+                            </a:schemeClr>
+                          </a:solidFill>
+                        </a:rPr>
+                        <a:t>Turbulence Calcs</a:t>
+                      </a:r>
+                    </a:p>
+                  </a:txBody>
+                  <a:tcPr/>
+                </a:tc>
+                <a:tc>
+                  <a:txBody>
+                    <a:bodyPr/>
+                    <a:lstStyle/>
+                    <a:p>
+                      <a:endParaRPr lang="en-AU" sz="900" dirty="0"/>
                     </a:p>
                   </a:txBody>
                   <a:tcPr/>
@@ -10002,6 +11018,131 @@
           </a:graphicData>
         </a:graphic>
       </p:graphicFrame>
+      <p:sp>
+        <p:nvSpPr>
+          <p:cNvPr id="5" name="TextBox 4">
+            <a:extLst>
+              <a:ext uri="{FF2B5EF4-FFF2-40B4-BE49-F238E27FC236}">
+                <a16:creationId xmlns:a16="http://schemas.microsoft.com/office/drawing/2014/main" id="{BF090DD6-1BCE-401F-A7DC-53F81AA5E0A5}"/>
+              </a:ext>
+            </a:extLst>
+          </p:cNvPr>
+          <p:cNvSpPr txBox="1"/>
+          <p:nvPr/>
+        </p:nvSpPr>
+        <p:spPr>
+          <a:xfrm>
+            <a:off x="258603" y="6261038"/>
+            <a:ext cx="9725501" cy="523220"/>
+          </a:xfrm>
+          <a:prstGeom prst="rect">
+            <a:avLst/>
+          </a:prstGeom>
+          <a:noFill/>
+        </p:spPr>
+        <p:txBody>
+          <a:bodyPr wrap="square">
+            <a:spAutoFit/>
+          </a:bodyPr>
+          <a:lstStyle/>
+          <a:p>
+            <a:r>
+              <a:rPr lang="en-AU" sz="1400" dirty="0"/>
+              <a:t>* For these instruments I’m going straight to Process Level 1 [to save space on SSD]</a:t>
+            </a:r>
+          </a:p>
+          <a:p>
+            <a:r>
+              <a:rPr lang="en-AU" sz="1400" dirty="0"/>
+              <a:t>** Not done at yet</a:t>
+            </a:r>
+          </a:p>
+        </p:txBody>
+      </p:sp>
+      <p:sp>
+        <p:nvSpPr>
+          <p:cNvPr id="6" name="TextBox 5">
+            <a:extLst>
+              <a:ext uri="{FF2B5EF4-FFF2-40B4-BE49-F238E27FC236}">
+                <a16:creationId xmlns:a16="http://schemas.microsoft.com/office/drawing/2014/main" id="{54CA7EF2-6DD3-4D75-BAC9-7BAE5325BAE6}"/>
+              </a:ext>
+            </a:extLst>
+          </p:cNvPr>
+          <p:cNvSpPr txBox="1"/>
+          <p:nvPr/>
+        </p:nvSpPr>
+        <p:spPr>
+          <a:xfrm>
+            <a:off x="5198256" y="73742"/>
+            <a:ext cx="6902146" cy="276999"/>
+          </a:xfrm>
+          <a:prstGeom prst="rect">
+            <a:avLst/>
+          </a:prstGeom>
+          <a:noFill/>
+        </p:spPr>
+        <p:txBody>
+          <a:bodyPr wrap="none" rtlCol="0">
+            <a:spAutoFit/>
+          </a:bodyPr>
+          <a:lstStyle/>
+          <a:p>
+            <a:r>
+              <a:rPr lang="en-AU" sz="1200" dirty="0"/>
+              <a:t>Black=done; </a:t>
+            </a:r>
+            <a:r>
+              <a:rPr lang="en-AU" sz="1200" dirty="0">
+                <a:solidFill>
+                  <a:schemeClr val="accent5">
+                    <a:lumMod val="75000"/>
+                  </a:schemeClr>
+                </a:solidFill>
+              </a:rPr>
+              <a:t>Blue=code tested but not in workflow; </a:t>
+            </a:r>
+            <a:r>
+              <a:rPr lang="en-AU" sz="1200" dirty="0">
+                <a:solidFill>
+                  <a:schemeClr val="accent2">
+                    <a:lumMod val="75000"/>
+                  </a:schemeClr>
+                </a:solidFill>
+              </a:rPr>
+              <a:t>Orange</a:t>
+            </a:r>
+            <a:r>
+              <a:rPr lang="en-AU" sz="1200" dirty="0"/>
+              <a:t> </a:t>
+            </a:r>
+            <a:r>
+              <a:rPr lang="en-AU" sz="1200" dirty="0">
+                <a:solidFill>
+                  <a:schemeClr val="accent2">
+                    <a:lumMod val="75000"/>
+                  </a:schemeClr>
+                </a:solidFill>
+              </a:rPr>
+              <a:t>= code needs further testing; </a:t>
+            </a:r>
+            <a:r>
+              <a:rPr lang="en-AU" sz="1200" dirty="0">
+                <a:solidFill>
+                  <a:srgbClr val="FF0000"/>
+                </a:solidFill>
+              </a:rPr>
+              <a:t>Red=Known Issues</a:t>
+            </a:r>
+            <a:endParaRPr lang="en-AU" sz="1200" dirty="0">
+              <a:solidFill>
+                <a:schemeClr val="accent2">
+                  <a:lumMod val="75000"/>
+                </a:schemeClr>
+              </a:solidFill>
+            </a:endParaRPr>
+          </a:p>
+        </p:txBody>
+      </p:sp>
     </p:spTree>
     <p:extLst>
       <p:ext uri="{BB962C8B-B14F-4D97-AF65-F5344CB8AC3E}">

</xml_diff>